<commit_message>
updates thorugh chapter 15
</commit_message>
<xml_diff>
--- a/Slides/PH223_Lecture_13.pptx
+++ b/Slides/PH223_Lecture_13.pptx
@@ -26,28 +26,28 @@
     <p:sldId id="1132" r:id="rId17"/>
     <p:sldId id="1433" r:id="rId18"/>
     <p:sldId id="258" r:id="rId19"/>
-    <p:sldId id="1431" r:id="rId20"/>
-    <p:sldId id="270" r:id="rId21"/>
-    <p:sldId id="276" r:id="rId22"/>
-    <p:sldId id="277" r:id="rId23"/>
-    <p:sldId id="279" r:id="rId24"/>
-    <p:sldId id="278" r:id="rId25"/>
-    <p:sldId id="280" r:id="rId26"/>
-    <p:sldId id="281" r:id="rId27"/>
-    <p:sldId id="282" r:id="rId28"/>
-    <p:sldId id="1441" r:id="rId29"/>
-    <p:sldId id="260" r:id="rId30"/>
-    <p:sldId id="261" r:id="rId31"/>
-    <p:sldId id="263" r:id="rId32"/>
-    <p:sldId id="1443" r:id="rId33"/>
-    <p:sldId id="1444" r:id="rId34"/>
-    <p:sldId id="1445" r:id="rId35"/>
-    <p:sldId id="262" r:id="rId36"/>
-    <p:sldId id="264" r:id="rId37"/>
-    <p:sldId id="266" r:id="rId38"/>
-    <p:sldId id="267" r:id="rId39"/>
-    <p:sldId id="265" r:id="rId40"/>
-    <p:sldId id="1314" r:id="rId41"/>
+    <p:sldId id="1314" r:id="rId20"/>
+    <p:sldId id="1431" r:id="rId21"/>
+    <p:sldId id="270" r:id="rId22"/>
+    <p:sldId id="276" r:id="rId23"/>
+    <p:sldId id="277" r:id="rId24"/>
+    <p:sldId id="279" r:id="rId25"/>
+    <p:sldId id="278" r:id="rId26"/>
+    <p:sldId id="280" r:id="rId27"/>
+    <p:sldId id="281" r:id="rId28"/>
+    <p:sldId id="282" r:id="rId29"/>
+    <p:sldId id="1441" r:id="rId30"/>
+    <p:sldId id="260" r:id="rId31"/>
+    <p:sldId id="261" r:id="rId32"/>
+    <p:sldId id="263" r:id="rId33"/>
+    <p:sldId id="1443" r:id="rId34"/>
+    <p:sldId id="1444" r:id="rId35"/>
+    <p:sldId id="1445" r:id="rId36"/>
+    <p:sldId id="262" r:id="rId37"/>
+    <p:sldId id="264" r:id="rId38"/>
+    <p:sldId id="266" r:id="rId39"/>
+    <p:sldId id="267" r:id="rId40"/>
+    <p:sldId id="265" r:id="rId41"/>
     <p:sldId id="1432" r:id="rId42"/>
   </p:sldIdLst>
   <p:sldSz cx="9144000" cy="6858000" type="screen4x3"/>
@@ -169,13 +169,114 @@
 <file path=ppt/revisionInfo.xml><?xml version="1.0" encoding="utf-8"?>
 <p1510:revInfo xmlns:a="http://schemas.openxmlformats.org/drawingml/2006/main" xmlns:r="http://schemas.openxmlformats.org/officeDocument/2006/relationships" xmlns:p1510="http://schemas.microsoft.com/office/powerpoint/2015/10/main">
   <p1510:revLst>
-    <p1510:client id="{B90322CF-17D3-400D-817F-6C5393075580}" v="26" dt="2024-11-07T17:52:21.412"/>
+    <p1510:client id="{82B4B33D-5A1A-42EF-94F9-DF8F3D859D8C}" v="5" dt="2025-10-03T21:45:06.476"/>
   </p1510:revLst>
 </p1510:revInfo>
 </file>
 
 <file path=ppt/changesInfos/changesInfo1.xml><?xml version="1.0" encoding="utf-8"?>
 <pc:chgInfo xmlns:a="http://schemas.openxmlformats.org/drawingml/2006/main" xmlns:r="http://schemas.openxmlformats.org/officeDocument/2006/relationships" xmlns:ac="http://schemas.microsoft.com/office/drawing/2013/main/command" xmlns:pc="http://schemas.microsoft.com/office/powerpoint/2013/main/command">
+  <pc:docChgLst>
+    <pc:chgData name="Lines, Todd" userId="afaf7c3a-e8aa-4568-882a-02ad8f9e19b0" providerId="ADAL" clId="{5FF5AC1B-ABA9-43D7-A1E3-2D92732CD6E2}"/>
+    <pc:docChg chg="custSel modSld sldOrd">
+      <pc:chgData name="Lines, Todd" userId="afaf7c3a-e8aa-4568-882a-02ad8f9e19b0" providerId="ADAL" clId="{5FF5AC1B-ABA9-43D7-A1E3-2D92732CD6E2}" dt="2025-10-03T21:45:06.476" v="20"/>
+      <pc:docMkLst>
+        <pc:docMk/>
+      </pc:docMkLst>
+      <pc:sldChg chg="modSp mod">
+        <pc:chgData name="Lines, Todd" userId="afaf7c3a-e8aa-4568-882a-02ad8f9e19b0" providerId="ADAL" clId="{5FF5AC1B-ABA9-43D7-A1E3-2D92732CD6E2}" dt="2025-10-03T21:39:52.003" v="1" actId="1076"/>
+        <pc:sldMkLst>
+          <pc:docMk/>
+          <pc:sldMk cId="1985487500" sldId="277"/>
+        </pc:sldMkLst>
+        <pc:grpChg chg="mod">
+          <ac:chgData name="Lines, Todd" userId="afaf7c3a-e8aa-4568-882a-02ad8f9e19b0" providerId="ADAL" clId="{5FF5AC1B-ABA9-43D7-A1E3-2D92732CD6E2}" dt="2025-10-03T21:39:52.003" v="1" actId="1076"/>
+          <ac:grpSpMkLst>
+            <pc:docMk/>
+            <pc:sldMk cId="1985487500" sldId="277"/>
+            <ac:grpSpMk id="22" creationId="{00000000-0000-0000-0000-000000000000}"/>
+          </ac:grpSpMkLst>
+        </pc:grpChg>
+      </pc:sldChg>
+      <pc:sldChg chg="addSp delSp modSp mod">
+        <pc:chgData name="Lines, Todd" userId="afaf7c3a-e8aa-4568-882a-02ad8f9e19b0" providerId="ADAL" clId="{5FF5AC1B-ABA9-43D7-A1E3-2D92732CD6E2}" dt="2025-10-03T21:40:57.761" v="15" actId="21"/>
+        <pc:sldMkLst>
+          <pc:docMk/>
+          <pc:sldMk cId="1307355996" sldId="280"/>
+        </pc:sldMkLst>
+        <pc:spChg chg="mod">
+          <ac:chgData name="Lines, Todd" userId="afaf7c3a-e8aa-4568-882a-02ad8f9e19b0" providerId="ADAL" clId="{5FF5AC1B-ABA9-43D7-A1E3-2D92732CD6E2}" dt="2025-10-03T21:40:39.443" v="13" actId="1076"/>
+          <ac:spMkLst>
+            <pc:docMk/>
+            <pc:sldMk cId="1307355996" sldId="280"/>
+            <ac:spMk id="4" creationId="{00000000-0000-0000-0000-000000000000}"/>
+          </ac:spMkLst>
+        </pc:spChg>
+        <pc:picChg chg="del mod">
+          <ac:chgData name="Lines, Todd" userId="afaf7c3a-e8aa-4568-882a-02ad8f9e19b0" providerId="ADAL" clId="{5FF5AC1B-ABA9-43D7-A1E3-2D92732CD6E2}" dt="2025-10-03T21:40:35.234" v="12" actId="478"/>
+          <ac:picMkLst>
+            <pc:docMk/>
+            <pc:sldMk cId="1307355996" sldId="280"/>
+            <ac:picMk id="16" creationId="{B6614A02-4882-FDF3-A73E-AE6388AF47A8}"/>
+          </ac:picMkLst>
+        </pc:picChg>
+        <pc:picChg chg="del mod">
+          <ac:chgData name="Lines, Todd" userId="afaf7c3a-e8aa-4568-882a-02ad8f9e19b0" providerId="ADAL" clId="{5FF5AC1B-ABA9-43D7-A1E3-2D92732CD6E2}" dt="2025-10-03T21:40:57.761" v="15" actId="21"/>
+          <ac:picMkLst>
+            <pc:docMk/>
+            <pc:sldMk cId="1307355996" sldId="280"/>
+            <ac:picMk id="17" creationId="{FF7CDBF4-F90F-B9C0-8E53-A78544135927}"/>
+          </ac:picMkLst>
+        </pc:picChg>
+        <pc:cxnChg chg="add mod">
+          <ac:chgData name="Lines, Todd" userId="afaf7c3a-e8aa-4568-882a-02ad8f9e19b0" providerId="ADAL" clId="{5FF5AC1B-ABA9-43D7-A1E3-2D92732CD6E2}" dt="2025-10-03T21:40:07.501" v="5" actId="14100"/>
+          <ac:cxnSpMkLst>
+            <pc:docMk/>
+            <pc:sldMk cId="1307355996" sldId="280"/>
+            <ac:cxnSpMk id="5" creationId="{F2FE13F7-3B90-8D11-8AAD-AC752FE2A3A9}"/>
+          </ac:cxnSpMkLst>
+        </pc:cxnChg>
+        <pc:cxnChg chg="add mod">
+          <ac:chgData name="Lines, Todd" userId="afaf7c3a-e8aa-4568-882a-02ad8f9e19b0" providerId="ADAL" clId="{5FF5AC1B-ABA9-43D7-A1E3-2D92732CD6E2}" dt="2025-10-03T21:40:13.136" v="8" actId="14100"/>
+          <ac:cxnSpMkLst>
+            <pc:docMk/>
+            <pc:sldMk cId="1307355996" sldId="280"/>
+            <ac:cxnSpMk id="11" creationId="{FB962E97-8433-37AA-5885-52B0F950483D}"/>
+          </ac:cxnSpMkLst>
+        </pc:cxnChg>
+      </pc:sldChg>
+      <pc:sldChg chg="modSp ord">
+        <pc:chgData name="Lines, Todd" userId="afaf7c3a-e8aa-4568-882a-02ad8f9e19b0" providerId="ADAL" clId="{5FF5AC1B-ABA9-43D7-A1E3-2D92732CD6E2}" dt="2025-10-03T21:45:06.476" v="20"/>
+        <pc:sldMkLst>
+          <pc:docMk/>
+          <pc:sldMk cId="0" sldId="1314"/>
+        </pc:sldMkLst>
+        <pc:spChg chg="mod">
+          <ac:chgData name="Lines, Todd" userId="afaf7c3a-e8aa-4568-882a-02ad8f9e19b0" providerId="ADAL" clId="{5FF5AC1B-ABA9-43D7-A1E3-2D92732CD6E2}" dt="2025-10-03T21:45:06.476" v="20"/>
+          <ac:spMkLst>
+            <pc:docMk/>
+            <pc:sldMk cId="0" sldId="1314"/>
+            <ac:spMk id="3" creationId="{00000000-0000-0000-0000-000000000000}"/>
+          </ac:spMkLst>
+        </pc:spChg>
+      </pc:sldChg>
+      <pc:sldChg chg="modSp mod">
+        <pc:chgData name="Lines, Todd" userId="afaf7c3a-e8aa-4568-882a-02ad8f9e19b0" providerId="ADAL" clId="{5FF5AC1B-ABA9-43D7-A1E3-2D92732CD6E2}" dt="2025-10-03T21:30:07.585" v="0" actId="20577"/>
+        <pc:sldMkLst>
+          <pc:docMk/>
+          <pc:sldMk cId="2763402161" sldId="1433"/>
+        </pc:sldMkLst>
+        <pc:spChg chg="mod">
+          <ac:chgData name="Lines, Todd" userId="afaf7c3a-e8aa-4568-882a-02ad8f9e19b0" providerId="ADAL" clId="{5FF5AC1B-ABA9-43D7-A1E3-2D92732CD6E2}" dt="2025-10-03T21:30:07.585" v="0" actId="20577"/>
+          <ac:spMkLst>
+            <pc:docMk/>
+            <pc:sldMk cId="2763402161" sldId="1433"/>
+            <ac:spMk id="3" creationId="{76F67A60-9F79-343B-06B4-F0E9E38AFC9C}"/>
+          </ac:spMkLst>
+        </pc:spChg>
+      </pc:sldChg>
+    </pc:docChg>
+  </pc:docChgLst>
   <pc:docChgLst>
     <pc:chgData name="Lines, Todd" userId="afaf7c3a-e8aa-4568-882a-02ad8f9e19b0" providerId="ADAL" clId="{37036659-BDE3-4B58-AA86-15475419174F}"/>
     <pc:docChg chg="modSld">
@@ -189,14 +290,6 @@
           <pc:docMk/>
           <pc:sldMk cId="3222375172" sldId="1432"/>
         </pc:sldMkLst>
-        <pc:spChg chg="mod">
-          <ac:chgData name="Lines, Todd" userId="afaf7c3a-e8aa-4568-882a-02ad8f9e19b0" providerId="ADAL" clId="{37036659-BDE3-4B58-AA86-15475419174F}" dt="2024-03-05T23:01:03.102" v="5" actId="6549"/>
-          <ac:spMkLst>
-            <pc:docMk/>
-            <pc:sldMk cId="3222375172" sldId="1432"/>
-            <ac:spMk id="3" creationId="{00000000-0000-0000-0000-000000000000}"/>
-          </ac:spMkLst>
-        </pc:spChg>
       </pc:sldChg>
     </pc:docChg>
   </pc:docChgLst>
@@ -213,14 +306,6 @@
           <pc:docMk/>
           <pc:sldMk cId="2880780699" sldId="1439"/>
         </pc:sldMkLst>
-        <pc:spChg chg="mod">
-          <ac:chgData name="Lines, Todd" userId="afaf7c3a-e8aa-4568-882a-02ad8f9e19b0" providerId="ADAL" clId="{B90322CF-17D3-400D-817F-6C5393075580}" dt="2024-11-07T17:51:57.105" v="26" actId="20577"/>
-          <ac:spMkLst>
-            <pc:docMk/>
-            <pc:sldMk cId="2880780699" sldId="1439"/>
-            <ac:spMk id="3" creationId="{00000000-0000-0000-0000-000000000000}"/>
-          </ac:spMkLst>
-        </pc:spChg>
       </pc:sldChg>
       <pc:sldChg chg="modSp">
         <pc:chgData name="Lines, Todd" userId="afaf7c3a-e8aa-4568-882a-02ad8f9e19b0" providerId="ADAL" clId="{B90322CF-17D3-400D-817F-6C5393075580}" dt="2024-11-07T17:52:21.412" v="27" actId="20577"/>
@@ -228,14 +313,6 @@
           <pc:docMk/>
           <pc:sldMk cId="986807166" sldId="1440"/>
         </pc:sldMkLst>
-        <pc:spChg chg="mod">
-          <ac:chgData name="Lines, Todd" userId="afaf7c3a-e8aa-4568-882a-02ad8f9e19b0" providerId="ADAL" clId="{B90322CF-17D3-400D-817F-6C5393075580}" dt="2024-11-07T17:52:21.412" v="27" actId="20577"/>
-          <ac:spMkLst>
-            <pc:docMk/>
-            <pc:sldMk cId="986807166" sldId="1440"/>
-            <ac:spMk id="3" creationId="{00000000-0000-0000-0000-000000000000}"/>
-          </ac:spMkLst>
-        </pc:spChg>
       </pc:sldChg>
       <pc:sldChg chg="modSp mod">
         <pc:chgData name="Lines, Todd" userId="afaf7c3a-e8aa-4568-882a-02ad8f9e19b0" providerId="ADAL" clId="{B90322CF-17D3-400D-817F-6C5393075580}" dt="2024-11-07T18:03:22.821" v="28" actId="20577"/>
@@ -243,14 +320,6 @@
           <pc:docMk/>
           <pc:sldMk cId="2080041333" sldId="1445"/>
         </pc:sldMkLst>
-        <pc:spChg chg="mod">
-          <ac:chgData name="Lines, Todd" userId="afaf7c3a-e8aa-4568-882a-02ad8f9e19b0" providerId="ADAL" clId="{B90322CF-17D3-400D-817F-6C5393075580}" dt="2024-11-07T18:03:22.821" v="28" actId="20577"/>
-          <ac:spMkLst>
-            <pc:docMk/>
-            <pc:sldMk cId="2080041333" sldId="1445"/>
-            <ac:spMk id="4" creationId="{9A30506A-D23B-206C-DE3F-D7B20224CB88}"/>
-          </ac:spMkLst>
-        </pc:spChg>
       </pc:sldChg>
     </pc:docChg>
   </pc:docChgLst>
@@ -267,14 +336,6 @@
           <pc:docMk/>
           <pc:sldMk cId="2080041333" sldId="1445"/>
         </pc:sldMkLst>
-        <pc:spChg chg="mod">
-          <ac:chgData name="Lines, Todd" userId="afaf7c3a-e8aa-4568-882a-02ad8f9e19b0" providerId="ADAL" clId="{D8F1E670-6E86-45DB-9AE6-746DDBE4C86C}" dt="2024-06-14T17:19:09.401" v="5" actId="11"/>
-          <ac:spMkLst>
-            <pc:docMk/>
-            <pc:sldMk cId="2080041333" sldId="1445"/>
-            <ac:spMk id="4" creationId="{9A30506A-D23B-206C-DE3F-D7B20224CB88}"/>
-          </ac:spMkLst>
-        </pc:spChg>
       </pc:sldChg>
     </pc:docChg>
   </pc:docChgLst>
@@ -382,22 +443,6 @@
           <pc:docMk/>
           <pc:sldMk cId="2763402161" sldId="1433"/>
         </pc:sldMkLst>
-        <pc:spChg chg="mod">
-          <ac:chgData name="Lines, Todd" userId="afaf7c3a-e8aa-4568-882a-02ad8f9e19b0" providerId="ADAL" clId="{D3357100-C15F-4183-B7DF-9FFD6B364804}" dt="2023-11-02T18:17:02.770" v="19" actId="20577"/>
-          <ac:spMkLst>
-            <pc:docMk/>
-            <pc:sldMk cId="2763402161" sldId="1433"/>
-            <ac:spMk id="2" creationId="{57E6A131-169C-CC29-5E50-1C46250BB084}"/>
-          </ac:spMkLst>
-        </pc:spChg>
-        <pc:spChg chg="mod">
-          <ac:chgData name="Lines, Todd" userId="afaf7c3a-e8aa-4568-882a-02ad8f9e19b0" providerId="ADAL" clId="{D3357100-C15F-4183-B7DF-9FFD6B364804}" dt="2023-11-02T18:18:41.728" v="270" actId="20577"/>
-          <ac:spMkLst>
-            <pc:docMk/>
-            <pc:sldMk cId="2763402161" sldId="1433"/>
-            <ac:spMk id="3" creationId="{76F67A60-9F79-343B-06B4-F0E9E38AFC9C}"/>
-          </ac:spMkLst>
-        </pc:spChg>
       </pc:sldChg>
       <pc:sldChg chg="modSp add mod">
         <pc:chgData name="Lines, Todd" userId="afaf7c3a-e8aa-4568-882a-02ad8f9e19b0" providerId="ADAL" clId="{D3357100-C15F-4183-B7DF-9FFD6B364804}" dt="2023-11-02T18:23:59.189" v="431" actId="20577"/>
@@ -405,14 +450,6 @@
           <pc:docMk/>
           <pc:sldMk cId="1895203931" sldId="1434"/>
         </pc:sldMkLst>
-        <pc:spChg chg="mod">
-          <ac:chgData name="Lines, Todd" userId="afaf7c3a-e8aa-4568-882a-02ad8f9e19b0" providerId="ADAL" clId="{D3357100-C15F-4183-B7DF-9FFD6B364804}" dt="2023-11-02T18:23:59.189" v="431" actId="20577"/>
-          <ac:spMkLst>
-            <pc:docMk/>
-            <pc:sldMk cId="1895203931" sldId="1434"/>
-            <ac:spMk id="3" creationId="{00000000-0000-0000-0000-000000000000}"/>
-          </ac:spMkLst>
-        </pc:spChg>
       </pc:sldChg>
       <pc:sldChg chg="add del">
         <pc:chgData name="Lines, Todd" userId="afaf7c3a-e8aa-4568-882a-02ad8f9e19b0" providerId="ADAL" clId="{D3357100-C15F-4183-B7DF-9FFD6B364804}" dt="2023-11-02T23:18:25.782" v="968" actId="47"/>
@@ -427,14 +464,6 @@
           <pc:docMk/>
           <pc:sldMk cId="3404149716" sldId="1436"/>
         </pc:sldMkLst>
-        <pc:picChg chg="add mod">
-          <ac:chgData name="Lines, Todd" userId="afaf7c3a-e8aa-4568-882a-02ad8f9e19b0" providerId="ADAL" clId="{D3357100-C15F-4183-B7DF-9FFD6B364804}" dt="2023-11-02T19:52:39.995" v="437" actId="1076"/>
-          <ac:picMkLst>
-            <pc:docMk/>
-            <pc:sldMk cId="3404149716" sldId="1436"/>
-            <ac:picMk id="5" creationId="{023B164E-2727-243C-66E3-49760FD8A7AB}"/>
-          </ac:picMkLst>
-        </pc:picChg>
       </pc:sldChg>
       <pc:sldChg chg="addSp modSp add mod">
         <pc:chgData name="Lines, Todd" userId="afaf7c3a-e8aa-4568-882a-02ad8f9e19b0" providerId="ADAL" clId="{D3357100-C15F-4183-B7DF-9FFD6B364804}" dt="2023-11-02T22:50:20.161" v="645" actId="20577"/>
@@ -442,502 +471,6 @@
           <pc:docMk/>
           <pc:sldMk cId="2365058830" sldId="1437"/>
         </pc:sldMkLst>
-        <pc:spChg chg="mod">
-          <ac:chgData name="Lines, Todd" userId="afaf7c3a-e8aa-4568-882a-02ad8f9e19b0" providerId="ADAL" clId="{D3357100-C15F-4183-B7DF-9FFD6B364804}" dt="2023-11-02T22:50:20.161" v="645" actId="20577"/>
-          <ac:spMkLst>
-            <pc:docMk/>
-            <pc:sldMk cId="2365058830" sldId="1437"/>
-            <ac:spMk id="2" creationId="{00000000-0000-0000-0000-000000000000}"/>
-          </ac:spMkLst>
-        </pc:spChg>
-        <pc:spChg chg="mod">
-          <ac:chgData name="Lines, Todd" userId="afaf7c3a-e8aa-4568-882a-02ad8f9e19b0" providerId="ADAL" clId="{D3357100-C15F-4183-B7DF-9FFD6B364804}" dt="2023-11-02T22:49:52.732" v="643" actId="20577"/>
-          <ac:spMkLst>
-            <pc:docMk/>
-            <pc:sldMk cId="2365058830" sldId="1437"/>
-            <ac:spMk id="3" creationId="{00000000-0000-0000-0000-000000000000}"/>
-          </ac:spMkLst>
-        </pc:spChg>
-        <pc:spChg chg="mod">
-          <ac:chgData name="Lines, Todd" userId="afaf7c3a-e8aa-4568-882a-02ad8f9e19b0" providerId="ADAL" clId="{D3357100-C15F-4183-B7DF-9FFD6B364804}" dt="2023-11-02T22:42:10.310" v="453" actId="404"/>
-          <ac:spMkLst>
-            <pc:docMk/>
-            <pc:sldMk cId="2365058830" sldId="1437"/>
-            <ac:spMk id="40" creationId="{6FA7F2D9-E1C2-78F3-66DA-1F729C71F157}"/>
-          </ac:spMkLst>
-        </pc:spChg>
-        <pc:spChg chg="add mod">
-          <ac:chgData name="Lines, Todd" userId="afaf7c3a-e8aa-4568-882a-02ad8f9e19b0" providerId="ADAL" clId="{D3357100-C15F-4183-B7DF-9FFD6B364804}" dt="2023-11-02T22:42:10.310" v="453" actId="404"/>
-          <ac:spMkLst>
-            <pc:docMk/>
-            <pc:sldMk cId="2365058830" sldId="1437"/>
-            <ac:spMk id="59" creationId="{63E25C2B-6931-D2A3-4715-2BB26129238C}"/>
-          </ac:spMkLst>
-        </pc:spChg>
-        <pc:spChg chg="add mod">
-          <ac:chgData name="Lines, Todd" userId="afaf7c3a-e8aa-4568-882a-02ad8f9e19b0" providerId="ADAL" clId="{D3357100-C15F-4183-B7DF-9FFD6B364804}" dt="2023-11-02T22:42:10.310" v="453" actId="404"/>
-          <ac:spMkLst>
-            <pc:docMk/>
-            <pc:sldMk cId="2365058830" sldId="1437"/>
-            <ac:spMk id="60" creationId="{E950131C-0F1E-41DE-2617-F88B9A672BDC}"/>
-          </ac:spMkLst>
-        </pc:spChg>
-        <pc:spChg chg="add mod">
-          <ac:chgData name="Lines, Todd" userId="afaf7c3a-e8aa-4568-882a-02ad8f9e19b0" providerId="ADAL" clId="{D3357100-C15F-4183-B7DF-9FFD6B364804}" dt="2023-11-02T22:42:10.310" v="453" actId="404"/>
-          <ac:spMkLst>
-            <pc:docMk/>
-            <pc:sldMk cId="2365058830" sldId="1437"/>
-            <ac:spMk id="61" creationId="{7656E828-99F9-4961-2E6B-1AA62FE6B9DF}"/>
-          </ac:spMkLst>
-        </pc:spChg>
-        <pc:spChg chg="add mod">
-          <ac:chgData name="Lines, Todd" userId="afaf7c3a-e8aa-4568-882a-02ad8f9e19b0" providerId="ADAL" clId="{D3357100-C15F-4183-B7DF-9FFD6B364804}" dt="2023-11-02T22:42:10.310" v="453" actId="404"/>
-          <ac:spMkLst>
-            <pc:docMk/>
-            <pc:sldMk cId="2365058830" sldId="1437"/>
-            <ac:spMk id="62" creationId="{DEACA297-395D-96A0-0C14-6B5CBE6BE75B}"/>
-          </ac:spMkLst>
-        </pc:spChg>
-        <pc:grpChg chg="add mod">
-          <ac:chgData name="Lines, Todd" userId="afaf7c3a-e8aa-4568-882a-02ad8f9e19b0" providerId="ADAL" clId="{D3357100-C15F-4183-B7DF-9FFD6B364804}" dt="2023-11-02T22:42:01.546" v="448" actId="164"/>
-          <ac:grpSpMkLst>
-            <pc:docMk/>
-            <pc:sldMk cId="2365058830" sldId="1437"/>
-            <ac:grpSpMk id="5" creationId="{9D8B3C33-B7EC-A3FC-431A-7154EA15E7F7}"/>
-          </ac:grpSpMkLst>
-        </pc:grpChg>
-        <pc:grpChg chg="mod">
-          <ac:chgData name="Lines, Todd" userId="afaf7c3a-e8aa-4568-882a-02ad8f9e19b0" providerId="ADAL" clId="{D3357100-C15F-4183-B7DF-9FFD6B364804}" dt="2023-11-02T22:41:57.273" v="447"/>
-          <ac:grpSpMkLst>
-            <pc:docMk/>
-            <pc:sldMk cId="2365058830" sldId="1437"/>
-            <ac:grpSpMk id="28" creationId="{FFA3E97E-8F4E-2B46-ED81-46255745857B}"/>
-          </ac:grpSpMkLst>
-        </pc:grpChg>
-        <pc:grpChg chg="mod">
-          <ac:chgData name="Lines, Todd" userId="afaf7c3a-e8aa-4568-882a-02ad8f9e19b0" providerId="ADAL" clId="{D3357100-C15F-4183-B7DF-9FFD6B364804}" dt="2023-11-02T22:41:57.273" v="447"/>
-          <ac:grpSpMkLst>
-            <pc:docMk/>
-            <pc:sldMk cId="2365058830" sldId="1437"/>
-            <ac:grpSpMk id="29" creationId="{8B9A4FD9-E114-9906-97DC-DF8C6233C857}"/>
-          </ac:grpSpMkLst>
-        </pc:grpChg>
-        <pc:grpChg chg="mod">
-          <ac:chgData name="Lines, Todd" userId="afaf7c3a-e8aa-4568-882a-02ad8f9e19b0" providerId="ADAL" clId="{D3357100-C15F-4183-B7DF-9FFD6B364804}" dt="2023-11-02T22:41:57.273" v="447"/>
-          <ac:grpSpMkLst>
-            <pc:docMk/>
-            <pc:sldMk cId="2365058830" sldId="1437"/>
-            <ac:grpSpMk id="30" creationId="{266D8743-C42A-472E-36F8-B0D41C23BB7C}"/>
-          </ac:grpSpMkLst>
-        </pc:grpChg>
-        <pc:grpChg chg="mod">
-          <ac:chgData name="Lines, Todd" userId="afaf7c3a-e8aa-4568-882a-02ad8f9e19b0" providerId="ADAL" clId="{D3357100-C15F-4183-B7DF-9FFD6B364804}" dt="2023-11-02T22:41:57.273" v="447"/>
-          <ac:grpSpMkLst>
-            <pc:docMk/>
-            <pc:sldMk cId="2365058830" sldId="1437"/>
-            <ac:grpSpMk id="31" creationId="{81256D33-9314-A168-B702-FCFD0BAD5B35}"/>
-          </ac:grpSpMkLst>
-        </pc:grpChg>
-        <pc:grpChg chg="add mod">
-          <ac:chgData name="Lines, Todd" userId="afaf7c3a-e8aa-4568-882a-02ad8f9e19b0" providerId="ADAL" clId="{D3357100-C15F-4183-B7DF-9FFD6B364804}" dt="2023-11-02T22:42:16.671" v="454" actId="1076"/>
-          <ac:grpSpMkLst>
-            <pc:docMk/>
-            <pc:sldMk cId="2365058830" sldId="1437"/>
-            <ac:grpSpMk id="64" creationId="{F3ACCC4A-9EA6-9DDB-DE69-0A3161A31EDC}"/>
-          </ac:grpSpMkLst>
-        </pc:grpChg>
-        <pc:cxnChg chg="mod">
-          <ac:chgData name="Lines, Todd" userId="afaf7c3a-e8aa-4568-882a-02ad8f9e19b0" providerId="ADAL" clId="{D3357100-C15F-4183-B7DF-9FFD6B364804}" dt="2023-11-02T22:41:57.273" v="447"/>
-          <ac:cxnSpMkLst>
-            <pc:docMk/>
-            <pc:sldMk cId="2365058830" sldId="1437"/>
-            <ac:cxnSpMk id="6" creationId="{1D5A7C43-A349-1C35-956E-884194603056}"/>
-          </ac:cxnSpMkLst>
-        </pc:cxnChg>
-        <pc:cxnChg chg="mod">
-          <ac:chgData name="Lines, Todd" userId="afaf7c3a-e8aa-4568-882a-02ad8f9e19b0" providerId="ADAL" clId="{D3357100-C15F-4183-B7DF-9FFD6B364804}" dt="2023-11-02T22:41:57.273" v="447"/>
-          <ac:cxnSpMkLst>
-            <pc:docMk/>
-            <pc:sldMk cId="2365058830" sldId="1437"/>
-            <ac:cxnSpMk id="7" creationId="{BBF9375B-17AD-7A37-D0BD-C0C80652EAF8}"/>
-          </ac:cxnSpMkLst>
-        </pc:cxnChg>
-        <pc:cxnChg chg="mod">
-          <ac:chgData name="Lines, Todd" userId="afaf7c3a-e8aa-4568-882a-02ad8f9e19b0" providerId="ADAL" clId="{D3357100-C15F-4183-B7DF-9FFD6B364804}" dt="2023-11-02T22:41:57.273" v="447"/>
-          <ac:cxnSpMkLst>
-            <pc:docMk/>
-            <pc:sldMk cId="2365058830" sldId="1437"/>
-            <ac:cxnSpMk id="8" creationId="{CC3807DF-E16F-1305-1D31-51E008230218}"/>
-          </ac:cxnSpMkLst>
-        </pc:cxnChg>
-        <pc:cxnChg chg="mod">
-          <ac:chgData name="Lines, Todd" userId="afaf7c3a-e8aa-4568-882a-02ad8f9e19b0" providerId="ADAL" clId="{D3357100-C15F-4183-B7DF-9FFD6B364804}" dt="2023-11-02T22:41:57.273" v="447"/>
-          <ac:cxnSpMkLst>
-            <pc:docMk/>
-            <pc:sldMk cId="2365058830" sldId="1437"/>
-            <ac:cxnSpMk id="9" creationId="{5C0F8952-A048-0C6C-31E2-95B053938240}"/>
-          </ac:cxnSpMkLst>
-        </pc:cxnChg>
-        <pc:cxnChg chg="mod">
-          <ac:chgData name="Lines, Todd" userId="afaf7c3a-e8aa-4568-882a-02ad8f9e19b0" providerId="ADAL" clId="{D3357100-C15F-4183-B7DF-9FFD6B364804}" dt="2023-11-02T22:41:57.273" v="447"/>
-          <ac:cxnSpMkLst>
-            <pc:docMk/>
-            <pc:sldMk cId="2365058830" sldId="1437"/>
-            <ac:cxnSpMk id="10" creationId="{590E38F6-8BB5-40E8-5AF3-1D1167BA4A38}"/>
-          </ac:cxnSpMkLst>
-        </pc:cxnChg>
-        <pc:cxnChg chg="mod">
-          <ac:chgData name="Lines, Todd" userId="afaf7c3a-e8aa-4568-882a-02ad8f9e19b0" providerId="ADAL" clId="{D3357100-C15F-4183-B7DF-9FFD6B364804}" dt="2023-11-02T22:41:57.273" v="447"/>
-          <ac:cxnSpMkLst>
-            <pc:docMk/>
-            <pc:sldMk cId="2365058830" sldId="1437"/>
-            <ac:cxnSpMk id="11" creationId="{862DFF33-A906-02D0-3C4C-701100B30B63}"/>
-          </ac:cxnSpMkLst>
-        </pc:cxnChg>
-        <pc:cxnChg chg="mod">
-          <ac:chgData name="Lines, Todd" userId="afaf7c3a-e8aa-4568-882a-02ad8f9e19b0" providerId="ADAL" clId="{D3357100-C15F-4183-B7DF-9FFD6B364804}" dt="2023-11-02T22:41:57.273" v="447"/>
-          <ac:cxnSpMkLst>
-            <pc:docMk/>
-            <pc:sldMk cId="2365058830" sldId="1437"/>
-            <ac:cxnSpMk id="12" creationId="{11FE25BE-6DF8-7AE3-5DE9-0CA7C4899F74}"/>
-          </ac:cxnSpMkLst>
-        </pc:cxnChg>
-        <pc:cxnChg chg="mod">
-          <ac:chgData name="Lines, Todd" userId="afaf7c3a-e8aa-4568-882a-02ad8f9e19b0" providerId="ADAL" clId="{D3357100-C15F-4183-B7DF-9FFD6B364804}" dt="2023-11-02T22:41:57.273" v="447"/>
-          <ac:cxnSpMkLst>
-            <pc:docMk/>
-            <pc:sldMk cId="2365058830" sldId="1437"/>
-            <ac:cxnSpMk id="13" creationId="{240F7640-756E-1ED6-A8A8-8AC1631A7E53}"/>
-          </ac:cxnSpMkLst>
-        </pc:cxnChg>
-        <pc:cxnChg chg="mod">
-          <ac:chgData name="Lines, Todd" userId="afaf7c3a-e8aa-4568-882a-02ad8f9e19b0" providerId="ADAL" clId="{D3357100-C15F-4183-B7DF-9FFD6B364804}" dt="2023-11-02T22:41:57.273" v="447"/>
-          <ac:cxnSpMkLst>
-            <pc:docMk/>
-            <pc:sldMk cId="2365058830" sldId="1437"/>
-            <ac:cxnSpMk id="14" creationId="{C780ECFD-60C9-A91D-22EB-1F8ADC59550E}"/>
-          </ac:cxnSpMkLst>
-        </pc:cxnChg>
-        <pc:cxnChg chg="mod">
-          <ac:chgData name="Lines, Todd" userId="afaf7c3a-e8aa-4568-882a-02ad8f9e19b0" providerId="ADAL" clId="{D3357100-C15F-4183-B7DF-9FFD6B364804}" dt="2023-11-02T22:41:57.273" v="447"/>
-          <ac:cxnSpMkLst>
-            <pc:docMk/>
-            <pc:sldMk cId="2365058830" sldId="1437"/>
-            <ac:cxnSpMk id="15" creationId="{A2EF561C-9F14-B836-87C7-F9BDE30FE6A1}"/>
-          </ac:cxnSpMkLst>
-        </pc:cxnChg>
-        <pc:cxnChg chg="mod">
-          <ac:chgData name="Lines, Todd" userId="afaf7c3a-e8aa-4568-882a-02ad8f9e19b0" providerId="ADAL" clId="{D3357100-C15F-4183-B7DF-9FFD6B364804}" dt="2023-11-02T22:41:57.273" v="447"/>
-          <ac:cxnSpMkLst>
-            <pc:docMk/>
-            <pc:sldMk cId="2365058830" sldId="1437"/>
-            <ac:cxnSpMk id="16" creationId="{58812DE6-7041-EB58-BFDD-DD0F4FAA379F}"/>
-          </ac:cxnSpMkLst>
-        </pc:cxnChg>
-        <pc:cxnChg chg="mod">
-          <ac:chgData name="Lines, Todd" userId="afaf7c3a-e8aa-4568-882a-02ad8f9e19b0" providerId="ADAL" clId="{D3357100-C15F-4183-B7DF-9FFD6B364804}" dt="2023-11-02T22:41:57.273" v="447"/>
-          <ac:cxnSpMkLst>
-            <pc:docMk/>
-            <pc:sldMk cId="2365058830" sldId="1437"/>
-            <ac:cxnSpMk id="17" creationId="{3B716806-8CB6-13E2-9217-6B988A96BC55}"/>
-          </ac:cxnSpMkLst>
-        </pc:cxnChg>
-        <pc:cxnChg chg="mod">
-          <ac:chgData name="Lines, Todd" userId="afaf7c3a-e8aa-4568-882a-02ad8f9e19b0" providerId="ADAL" clId="{D3357100-C15F-4183-B7DF-9FFD6B364804}" dt="2023-11-02T22:41:57.273" v="447"/>
-          <ac:cxnSpMkLst>
-            <pc:docMk/>
-            <pc:sldMk cId="2365058830" sldId="1437"/>
-            <ac:cxnSpMk id="18" creationId="{AAE0BE7E-D1B0-EB9E-60CA-11356EDEC99E}"/>
-          </ac:cxnSpMkLst>
-        </pc:cxnChg>
-        <pc:cxnChg chg="mod">
-          <ac:chgData name="Lines, Todd" userId="afaf7c3a-e8aa-4568-882a-02ad8f9e19b0" providerId="ADAL" clId="{D3357100-C15F-4183-B7DF-9FFD6B364804}" dt="2023-11-02T22:41:57.273" v="447"/>
-          <ac:cxnSpMkLst>
-            <pc:docMk/>
-            <pc:sldMk cId="2365058830" sldId="1437"/>
-            <ac:cxnSpMk id="19" creationId="{F217E22B-B21E-1A5D-59F4-21039BC29873}"/>
-          </ac:cxnSpMkLst>
-        </pc:cxnChg>
-        <pc:cxnChg chg="mod">
-          <ac:chgData name="Lines, Todd" userId="afaf7c3a-e8aa-4568-882a-02ad8f9e19b0" providerId="ADAL" clId="{D3357100-C15F-4183-B7DF-9FFD6B364804}" dt="2023-11-02T22:41:57.273" v="447"/>
-          <ac:cxnSpMkLst>
-            <pc:docMk/>
-            <pc:sldMk cId="2365058830" sldId="1437"/>
-            <ac:cxnSpMk id="20" creationId="{DF2EA362-FF49-3F9A-0DE2-FB181639A34F}"/>
-          </ac:cxnSpMkLst>
-        </pc:cxnChg>
-        <pc:cxnChg chg="mod">
-          <ac:chgData name="Lines, Todd" userId="afaf7c3a-e8aa-4568-882a-02ad8f9e19b0" providerId="ADAL" clId="{D3357100-C15F-4183-B7DF-9FFD6B364804}" dt="2023-11-02T22:41:57.273" v="447"/>
-          <ac:cxnSpMkLst>
-            <pc:docMk/>
-            <pc:sldMk cId="2365058830" sldId="1437"/>
-            <ac:cxnSpMk id="21" creationId="{ADEDB62B-4989-AAA2-B145-596696E5A8BC}"/>
-          </ac:cxnSpMkLst>
-        </pc:cxnChg>
-        <pc:cxnChg chg="mod">
-          <ac:chgData name="Lines, Todd" userId="afaf7c3a-e8aa-4568-882a-02ad8f9e19b0" providerId="ADAL" clId="{D3357100-C15F-4183-B7DF-9FFD6B364804}" dt="2023-11-02T22:41:57.273" v="447"/>
-          <ac:cxnSpMkLst>
-            <pc:docMk/>
-            <pc:sldMk cId="2365058830" sldId="1437"/>
-            <ac:cxnSpMk id="22" creationId="{990C8459-3863-1B1E-3135-8C18D6780D1C}"/>
-          </ac:cxnSpMkLst>
-        </pc:cxnChg>
-        <pc:cxnChg chg="mod">
-          <ac:chgData name="Lines, Todd" userId="afaf7c3a-e8aa-4568-882a-02ad8f9e19b0" providerId="ADAL" clId="{D3357100-C15F-4183-B7DF-9FFD6B364804}" dt="2023-11-02T22:41:57.273" v="447"/>
-          <ac:cxnSpMkLst>
-            <pc:docMk/>
-            <pc:sldMk cId="2365058830" sldId="1437"/>
-            <ac:cxnSpMk id="23" creationId="{AB4D9F06-4E18-927A-B82A-55F664E60075}"/>
-          </ac:cxnSpMkLst>
-        </pc:cxnChg>
-        <pc:cxnChg chg="mod">
-          <ac:chgData name="Lines, Todd" userId="afaf7c3a-e8aa-4568-882a-02ad8f9e19b0" providerId="ADAL" clId="{D3357100-C15F-4183-B7DF-9FFD6B364804}" dt="2023-11-02T22:41:57.273" v="447"/>
-          <ac:cxnSpMkLst>
-            <pc:docMk/>
-            <pc:sldMk cId="2365058830" sldId="1437"/>
-            <ac:cxnSpMk id="24" creationId="{69D8D32E-AD7B-A3C5-12E7-66EA0038034D}"/>
-          </ac:cxnSpMkLst>
-        </pc:cxnChg>
-        <pc:cxnChg chg="mod">
-          <ac:chgData name="Lines, Todd" userId="afaf7c3a-e8aa-4568-882a-02ad8f9e19b0" providerId="ADAL" clId="{D3357100-C15F-4183-B7DF-9FFD6B364804}" dt="2023-11-02T22:41:57.273" v="447"/>
-          <ac:cxnSpMkLst>
-            <pc:docMk/>
-            <pc:sldMk cId="2365058830" sldId="1437"/>
-            <ac:cxnSpMk id="25" creationId="{7DC21188-5DEA-2766-FC69-9739E7C7F350}"/>
-          </ac:cxnSpMkLst>
-        </pc:cxnChg>
-        <pc:cxnChg chg="mod">
-          <ac:chgData name="Lines, Todd" userId="afaf7c3a-e8aa-4568-882a-02ad8f9e19b0" providerId="ADAL" clId="{D3357100-C15F-4183-B7DF-9FFD6B364804}" dt="2023-11-02T22:41:57.273" v="447"/>
-          <ac:cxnSpMkLst>
-            <pc:docMk/>
-            <pc:sldMk cId="2365058830" sldId="1437"/>
-            <ac:cxnSpMk id="26" creationId="{08A6E36C-EE9E-D845-186D-6D95B68F2E1A}"/>
-          </ac:cxnSpMkLst>
-        </pc:cxnChg>
-        <pc:cxnChg chg="mod">
-          <ac:chgData name="Lines, Todd" userId="afaf7c3a-e8aa-4568-882a-02ad8f9e19b0" providerId="ADAL" clId="{D3357100-C15F-4183-B7DF-9FFD6B364804}" dt="2023-11-02T22:41:57.273" v="447"/>
-          <ac:cxnSpMkLst>
-            <pc:docMk/>
-            <pc:sldMk cId="2365058830" sldId="1437"/>
-            <ac:cxnSpMk id="27" creationId="{1B2E57D2-CD01-D713-5BC8-21A420BF2184}"/>
-          </ac:cxnSpMkLst>
-        </pc:cxnChg>
-        <pc:cxnChg chg="mod">
-          <ac:chgData name="Lines, Todd" userId="afaf7c3a-e8aa-4568-882a-02ad8f9e19b0" providerId="ADAL" clId="{D3357100-C15F-4183-B7DF-9FFD6B364804}" dt="2023-11-02T22:41:57.273" v="447"/>
-          <ac:cxnSpMkLst>
-            <pc:docMk/>
-            <pc:sldMk cId="2365058830" sldId="1437"/>
-            <ac:cxnSpMk id="32" creationId="{53964C02-1582-5ACC-78DC-63E3F9FE7196}"/>
-          </ac:cxnSpMkLst>
-        </pc:cxnChg>
-        <pc:cxnChg chg="mod">
-          <ac:chgData name="Lines, Todd" userId="afaf7c3a-e8aa-4568-882a-02ad8f9e19b0" providerId="ADAL" clId="{D3357100-C15F-4183-B7DF-9FFD6B364804}" dt="2023-11-02T22:41:57.273" v="447"/>
-          <ac:cxnSpMkLst>
-            <pc:docMk/>
-            <pc:sldMk cId="2365058830" sldId="1437"/>
-            <ac:cxnSpMk id="33" creationId="{6A3FBF3F-04DE-4EB2-E688-31FC231D85CA}"/>
-          </ac:cxnSpMkLst>
-        </pc:cxnChg>
-        <pc:cxnChg chg="mod">
-          <ac:chgData name="Lines, Todd" userId="afaf7c3a-e8aa-4568-882a-02ad8f9e19b0" providerId="ADAL" clId="{D3357100-C15F-4183-B7DF-9FFD6B364804}" dt="2023-11-02T22:41:57.273" v="447"/>
-          <ac:cxnSpMkLst>
-            <pc:docMk/>
-            <pc:sldMk cId="2365058830" sldId="1437"/>
-            <ac:cxnSpMk id="34" creationId="{8BAC47E4-CF9F-EF2D-A236-FEEE08FAE311}"/>
-          </ac:cxnSpMkLst>
-        </pc:cxnChg>
-        <pc:cxnChg chg="mod">
-          <ac:chgData name="Lines, Todd" userId="afaf7c3a-e8aa-4568-882a-02ad8f9e19b0" providerId="ADAL" clId="{D3357100-C15F-4183-B7DF-9FFD6B364804}" dt="2023-11-02T22:41:57.273" v="447"/>
-          <ac:cxnSpMkLst>
-            <pc:docMk/>
-            <pc:sldMk cId="2365058830" sldId="1437"/>
-            <ac:cxnSpMk id="35" creationId="{1BC6A51E-57A3-0574-12E2-957B4D8E4B7E}"/>
-          </ac:cxnSpMkLst>
-        </pc:cxnChg>
-        <pc:cxnChg chg="mod">
-          <ac:chgData name="Lines, Todd" userId="afaf7c3a-e8aa-4568-882a-02ad8f9e19b0" providerId="ADAL" clId="{D3357100-C15F-4183-B7DF-9FFD6B364804}" dt="2023-11-02T22:41:57.273" v="447"/>
-          <ac:cxnSpMkLst>
-            <pc:docMk/>
-            <pc:sldMk cId="2365058830" sldId="1437"/>
-            <ac:cxnSpMk id="36" creationId="{4116CC38-0E4D-B91C-9D17-18438D67E337}"/>
-          </ac:cxnSpMkLst>
-        </pc:cxnChg>
-        <pc:cxnChg chg="mod">
-          <ac:chgData name="Lines, Todd" userId="afaf7c3a-e8aa-4568-882a-02ad8f9e19b0" providerId="ADAL" clId="{D3357100-C15F-4183-B7DF-9FFD6B364804}" dt="2023-11-02T22:41:57.273" v="447"/>
-          <ac:cxnSpMkLst>
-            <pc:docMk/>
-            <pc:sldMk cId="2365058830" sldId="1437"/>
-            <ac:cxnSpMk id="37" creationId="{0A5CCD25-D061-2E42-2534-5659F04110AA}"/>
-          </ac:cxnSpMkLst>
-        </pc:cxnChg>
-        <pc:cxnChg chg="mod">
-          <ac:chgData name="Lines, Todd" userId="afaf7c3a-e8aa-4568-882a-02ad8f9e19b0" providerId="ADAL" clId="{D3357100-C15F-4183-B7DF-9FFD6B364804}" dt="2023-11-02T22:41:57.273" v="447"/>
-          <ac:cxnSpMkLst>
-            <pc:docMk/>
-            <pc:sldMk cId="2365058830" sldId="1437"/>
-            <ac:cxnSpMk id="38" creationId="{6D168621-53D6-BCCE-E40F-EC5F04C9D163}"/>
-          </ac:cxnSpMkLst>
-        </pc:cxnChg>
-        <pc:cxnChg chg="mod">
-          <ac:chgData name="Lines, Todd" userId="afaf7c3a-e8aa-4568-882a-02ad8f9e19b0" providerId="ADAL" clId="{D3357100-C15F-4183-B7DF-9FFD6B364804}" dt="2023-11-02T22:41:57.273" v="447"/>
-          <ac:cxnSpMkLst>
-            <pc:docMk/>
-            <pc:sldMk cId="2365058830" sldId="1437"/>
-            <ac:cxnSpMk id="39" creationId="{EA35A535-7185-F621-688F-FF244BA4711B}"/>
-          </ac:cxnSpMkLst>
-        </pc:cxnChg>
-        <pc:cxnChg chg="mod">
-          <ac:chgData name="Lines, Todd" userId="afaf7c3a-e8aa-4568-882a-02ad8f9e19b0" providerId="ADAL" clId="{D3357100-C15F-4183-B7DF-9FFD6B364804}" dt="2023-11-02T22:41:57.273" v="447"/>
-          <ac:cxnSpMkLst>
-            <pc:docMk/>
-            <pc:sldMk cId="2365058830" sldId="1437"/>
-            <ac:cxnSpMk id="41" creationId="{F209ACDB-5406-37BF-5F9E-6A9D0F62C0DA}"/>
-          </ac:cxnSpMkLst>
-        </pc:cxnChg>
-        <pc:cxnChg chg="mod">
-          <ac:chgData name="Lines, Todd" userId="afaf7c3a-e8aa-4568-882a-02ad8f9e19b0" providerId="ADAL" clId="{D3357100-C15F-4183-B7DF-9FFD6B364804}" dt="2023-11-02T22:41:57.273" v="447"/>
-          <ac:cxnSpMkLst>
-            <pc:docMk/>
-            <pc:sldMk cId="2365058830" sldId="1437"/>
-            <ac:cxnSpMk id="42" creationId="{0E6BCF17-CD97-D901-15BC-BDC2A4001755}"/>
-          </ac:cxnSpMkLst>
-        </pc:cxnChg>
-        <pc:cxnChg chg="mod">
-          <ac:chgData name="Lines, Todd" userId="afaf7c3a-e8aa-4568-882a-02ad8f9e19b0" providerId="ADAL" clId="{D3357100-C15F-4183-B7DF-9FFD6B364804}" dt="2023-11-02T22:41:57.273" v="447"/>
-          <ac:cxnSpMkLst>
-            <pc:docMk/>
-            <pc:sldMk cId="2365058830" sldId="1437"/>
-            <ac:cxnSpMk id="43" creationId="{D9B6A60B-F5A9-5B79-82C8-3E94507221EC}"/>
-          </ac:cxnSpMkLst>
-        </pc:cxnChg>
-        <pc:cxnChg chg="mod">
-          <ac:chgData name="Lines, Todd" userId="afaf7c3a-e8aa-4568-882a-02ad8f9e19b0" providerId="ADAL" clId="{D3357100-C15F-4183-B7DF-9FFD6B364804}" dt="2023-11-02T22:41:57.273" v="447"/>
-          <ac:cxnSpMkLst>
-            <pc:docMk/>
-            <pc:sldMk cId="2365058830" sldId="1437"/>
-            <ac:cxnSpMk id="44" creationId="{0C0E0F41-CF19-7E97-8EB1-298A7927B404}"/>
-          </ac:cxnSpMkLst>
-        </pc:cxnChg>
-        <pc:cxnChg chg="mod">
-          <ac:chgData name="Lines, Todd" userId="afaf7c3a-e8aa-4568-882a-02ad8f9e19b0" providerId="ADAL" clId="{D3357100-C15F-4183-B7DF-9FFD6B364804}" dt="2023-11-02T22:41:57.273" v="447"/>
-          <ac:cxnSpMkLst>
-            <pc:docMk/>
-            <pc:sldMk cId="2365058830" sldId="1437"/>
-            <ac:cxnSpMk id="45" creationId="{2E34E7D5-5215-17FF-DCC2-1E2C94C2D8B9}"/>
-          </ac:cxnSpMkLst>
-        </pc:cxnChg>
-        <pc:cxnChg chg="mod">
-          <ac:chgData name="Lines, Todd" userId="afaf7c3a-e8aa-4568-882a-02ad8f9e19b0" providerId="ADAL" clId="{D3357100-C15F-4183-B7DF-9FFD6B364804}" dt="2023-11-02T22:41:57.273" v="447"/>
-          <ac:cxnSpMkLst>
-            <pc:docMk/>
-            <pc:sldMk cId="2365058830" sldId="1437"/>
-            <ac:cxnSpMk id="46" creationId="{3EB33DB9-EECA-A777-5C2B-4488C843B23D}"/>
-          </ac:cxnSpMkLst>
-        </pc:cxnChg>
-        <pc:cxnChg chg="mod">
-          <ac:chgData name="Lines, Todd" userId="afaf7c3a-e8aa-4568-882a-02ad8f9e19b0" providerId="ADAL" clId="{D3357100-C15F-4183-B7DF-9FFD6B364804}" dt="2023-11-02T22:41:57.273" v="447"/>
-          <ac:cxnSpMkLst>
-            <pc:docMk/>
-            <pc:sldMk cId="2365058830" sldId="1437"/>
-            <ac:cxnSpMk id="47" creationId="{373E37FB-DF38-DCA4-58AA-1B3D20BBF4DA}"/>
-          </ac:cxnSpMkLst>
-        </pc:cxnChg>
-        <pc:cxnChg chg="mod">
-          <ac:chgData name="Lines, Todd" userId="afaf7c3a-e8aa-4568-882a-02ad8f9e19b0" providerId="ADAL" clId="{D3357100-C15F-4183-B7DF-9FFD6B364804}" dt="2023-11-02T22:41:57.273" v="447"/>
-          <ac:cxnSpMkLst>
-            <pc:docMk/>
-            <pc:sldMk cId="2365058830" sldId="1437"/>
-            <ac:cxnSpMk id="48" creationId="{AD9DCE56-C0CC-0426-DC62-26D7537C8427}"/>
-          </ac:cxnSpMkLst>
-        </pc:cxnChg>
-        <pc:cxnChg chg="mod">
-          <ac:chgData name="Lines, Todd" userId="afaf7c3a-e8aa-4568-882a-02ad8f9e19b0" providerId="ADAL" clId="{D3357100-C15F-4183-B7DF-9FFD6B364804}" dt="2023-11-02T22:41:57.273" v="447"/>
-          <ac:cxnSpMkLst>
-            <pc:docMk/>
-            <pc:sldMk cId="2365058830" sldId="1437"/>
-            <ac:cxnSpMk id="49" creationId="{89D96D89-8608-2F65-8A0C-45039EBF436B}"/>
-          </ac:cxnSpMkLst>
-        </pc:cxnChg>
-        <pc:cxnChg chg="mod">
-          <ac:chgData name="Lines, Todd" userId="afaf7c3a-e8aa-4568-882a-02ad8f9e19b0" providerId="ADAL" clId="{D3357100-C15F-4183-B7DF-9FFD6B364804}" dt="2023-11-02T22:41:57.273" v="447"/>
-          <ac:cxnSpMkLst>
-            <pc:docMk/>
-            <pc:sldMk cId="2365058830" sldId="1437"/>
-            <ac:cxnSpMk id="50" creationId="{FBA89FEF-E383-C9AC-7DCC-9DD55E4454C8}"/>
-          </ac:cxnSpMkLst>
-        </pc:cxnChg>
-        <pc:cxnChg chg="mod">
-          <ac:chgData name="Lines, Todd" userId="afaf7c3a-e8aa-4568-882a-02ad8f9e19b0" providerId="ADAL" clId="{D3357100-C15F-4183-B7DF-9FFD6B364804}" dt="2023-11-02T22:41:57.273" v="447"/>
-          <ac:cxnSpMkLst>
-            <pc:docMk/>
-            <pc:sldMk cId="2365058830" sldId="1437"/>
-            <ac:cxnSpMk id="51" creationId="{483937DD-3E36-54E5-301A-35372D6E5D98}"/>
-          </ac:cxnSpMkLst>
-        </pc:cxnChg>
-        <pc:cxnChg chg="mod">
-          <ac:chgData name="Lines, Todd" userId="afaf7c3a-e8aa-4568-882a-02ad8f9e19b0" providerId="ADAL" clId="{D3357100-C15F-4183-B7DF-9FFD6B364804}" dt="2023-11-02T22:41:57.273" v="447"/>
-          <ac:cxnSpMkLst>
-            <pc:docMk/>
-            <pc:sldMk cId="2365058830" sldId="1437"/>
-            <ac:cxnSpMk id="52" creationId="{1409A35C-0846-48BF-CC0C-5C010AE33C82}"/>
-          </ac:cxnSpMkLst>
-        </pc:cxnChg>
-        <pc:cxnChg chg="mod">
-          <ac:chgData name="Lines, Todd" userId="afaf7c3a-e8aa-4568-882a-02ad8f9e19b0" providerId="ADAL" clId="{D3357100-C15F-4183-B7DF-9FFD6B364804}" dt="2023-11-02T22:41:57.273" v="447"/>
-          <ac:cxnSpMkLst>
-            <pc:docMk/>
-            <pc:sldMk cId="2365058830" sldId="1437"/>
-            <ac:cxnSpMk id="53" creationId="{239D2E76-B095-8891-ABAD-160D6E8F88F9}"/>
-          </ac:cxnSpMkLst>
-        </pc:cxnChg>
-        <pc:cxnChg chg="mod">
-          <ac:chgData name="Lines, Todd" userId="afaf7c3a-e8aa-4568-882a-02ad8f9e19b0" providerId="ADAL" clId="{D3357100-C15F-4183-B7DF-9FFD6B364804}" dt="2023-11-02T22:41:57.273" v="447"/>
-          <ac:cxnSpMkLst>
-            <pc:docMk/>
-            <pc:sldMk cId="2365058830" sldId="1437"/>
-            <ac:cxnSpMk id="54" creationId="{B5A620CE-6753-1C74-556C-C438C943724F}"/>
-          </ac:cxnSpMkLst>
-        </pc:cxnChg>
-        <pc:cxnChg chg="mod">
-          <ac:chgData name="Lines, Todd" userId="afaf7c3a-e8aa-4568-882a-02ad8f9e19b0" providerId="ADAL" clId="{D3357100-C15F-4183-B7DF-9FFD6B364804}" dt="2023-11-02T22:41:57.273" v="447"/>
-          <ac:cxnSpMkLst>
-            <pc:docMk/>
-            <pc:sldMk cId="2365058830" sldId="1437"/>
-            <ac:cxnSpMk id="55" creationId="{F10F9D96-CFAD-C1CF-E5FD-DBEB06385F99}"/>
-          </ac:cxnSpMkLst>
-        </pc:cxnChg>
-        <pc:cxnChg chg="mod">
-          <ac:chgData name="Lines, Todd" userId="afaf7c3a-e8aa-4568-882a-02ad8f9e19b0" providerId="ADAL" clId="{D3357100-C15F-4183-B7DF-9FFD6B364804}" dt="2023-11-02T22:41:57.273" v="447"/>
-          <ac:cxnSpMkLst>
-            <pc:docMk/>
-            <pc:sldMk cId="2365058830" sldId="1437"/>
-            <ac:cxnSpMk id="56" creationId="{92F1C440-B84E-AA0D-84B0-32E38826BC6C}"/>
-          </ac:cxnSpMkLst>
-        </pc:cxnChg>
-        <pc:cxnChg chg="mod">
-          <ac:chgData name="Lines, Todd" userId="afaf7c3a-e8aa-4568-882a-02ad8f9e19b0" providerId="ADAL" clId="{D3357100-C15F-4183-B7DF-9FFD6B364804}" dt="2023-11-02T22:41:57.273" v="447"/>
-          <ac:cxnSpMkLst>
-            <pc:docMk/>
-            <pc:sldMk cId="2365058830" sldId="1437"/>
-            <ac:cxnSpMk id="57" creationId="{CD48AFB3-51FC-A268-EA1A-011F2529BA2A}"/>
-          </ac:cxnSpMkLst>
-        </pc:cxnChg>
-        <pc:cxnChg chg="mod">
-          <ac:chgData name="Lines, Todd" userId="afaf7c3a-e8aa-4568-882a-02ad8f9e19b0" providerId="ADAL" clId="{D3357100-C15F-4183-B7DF-9FFD6B364804}" dt="2023-11-02T22:41:57.273" v="447"/>
-          <ac:cxnSpMkLst>
-            <pc:docMk/>
-            <pc:sldMk cId="2365058830" sldId="1437"/>
-            <ac:cxnSpMk id="58" creationId="{0098E955-2808-48BB-7AD2-B8B89C5A53C2}"/>
-          </ac:cxnSpMkLst>
-        </pc:cxnChg>
-        <pc:cxnChg chg="add mod">
-          <ac:chgData name="Lines, Todd" userId="afaf7c3a-e8aa-4568-882a-02ad8f9e19b0" providerId="ADAL" clId="{D3357100-C15F-4183-B7DF-9FFD6B364804}" dt="2023-11-02T22:42:01.546" v="448" actId="164"/>
-          <ac:cxnSpMkLst>
-            <pc:docMk/>
-            <pc:sldMk cId="2365058830" sldId="1437"/>
-            <ac:cxnSpMk id="63" creationId="{63D18AC8-13F2-35B7-207F-660920168423}"/>
-          </ac:cxnSpMkLst>
-        </pc:cxnChg>
       </pc:sldChg>
       <pc:sldChg chg="modSp add mod">
         <pc:chgData name="Lines, Todd" userId="afaf7c3a-e8aa-4568-882a-02ad8f9e19b0" providerId="ADAL" clId="{D3357100-C15F-4183-B7DF-9FFD6B364804}" dt="2023-11-02T22:56:09.732" v="757" actId="20577"/>
@@ -945,22 +478,6 @@
           <pc:docMk/>
           <pc:sldMk cId="3065316880" sldId="1438"/>
         </pc:sldMkLst>
-        <pc:spChg chg="mod">
-          <ac:chgData name="Lines, Todd" userId="afaf7c3a-e8aa-4568-882a-02ad8f9e19b0" providerId="ADAL" clId="{D3357100-C15F-4183-B7DF-9FFD6B364804}" dt="2023-11-02T22:50:30.302" v="648" actId="20577"/>
-          <ac:spMkLst>
-            <pc:docMk/>
-            <pc:sldMk cId="3065316880" sldId="1438"/>
-            <ac:spMk id="2" creationId="{00000000-0000-0000-0000-000000000000}"/>
-          </ac:spMkLst>
-        </pc:spChg>
-        <pc:spChg chg="mod">
-          <ac:chgData name="Lines, Todd" userId="afaf7c3a-e8aa-4568-882a-02ad8f9e19b0" providerId="ADAL" clId="{D3357100-C15F-4183-B7DF-9FFD6B364804}" dt="2023-11-02T22:56:09.732" v="757" actId="20577"/>
-          <ac:spMkLst>
-            <pc:docMk/>
-            <pc:sldMk cId="3065316880" sldId="1438"/>
-            <ac:spMk id="3" creationId="{00000000-0000-0000-0000-000000000000}"/>
-          </ac:spMkLst>
-        </pc:spChg>
       </pc:sldChg>
       <pc:sldChg chg="modSp add mod">
         <pc:chgData name="Lines, Todd" userId="afaf7c3a-e8aa-4568-882a-02ad8f9e19b0" providerId="ADAL" clId="{D3357100-C15F-4183-B7DF-9FFD6B364804}" dt="2023-11-02T22:58:52.656" v="780" actId="20577"/>
@@ -968,22 +485,6 @@
           <pc:docMk/>
           <pc:sldMk cId="2880780699" sldId="1439"/>
         </pc:sldMkLst>
-        <pc:spChg chg="mod">
-          <ac:chgData name="Lines, Todd" userId="afaf7c3a-e8aa-4568-882a-02ad8f9e19b0" providerId="ADAL" clId="{D3357100-C15F-4183-B7DF-9FFD6B364804}" dt="2023-11-02T22:58:52.656" v="780" actId="20577"/>
-          <ac:spMkLst>
-            <pc:docMk/>
-            <pc:sldMk cId="2880780699" sldId="1439"/>
-            <ac:spMk id="2" creationId="{00000000-0000-0000-0000-000000000000}"/>
-          </ac:spMkLst>
-        </pc:spChg>
-        <pc:spChg chg="mod">
-          <ac:chgData name="Lines, Todd" userId="afaf7c3a-e8aa-4568-882a-02ad8f9e19b0" providerId="ADAL" clId="{D3357100-C15F-4183-B7DF-9FFD6B364804}" dt="2023-11-02T22:58:01.461" v="777" actId="20577"/>
-          <ac:spMkLst>
-            <pc:docMk/>
-            <pc:sldMk cId="2880780699" sldId="1439"/>
-            <ac:spMk id="3" creationId="{00000000-0000-0000-0000-000000000000}"/>
-          </ac:spMkLst>
-        </pc:spChg>
       </pc:sldChg>
       <pc:sldChg chg="modSp add mod">
         <pc:chgData name="Lines, Todd" userId="afaf7c3a-e8aa-4568-882a-02ad8f9e19b0" providerId="ADAL" clId="{D3357100-C15F-4183-B7DF-9FFD6B364804}" dt="2023-11-02T23:04:13.465" v="837" actId="20577"/>
@@ -991,22 +492,6 @@
           <pc:docMk/>
           <pc:sldMk cId="986807166" sldId="1440"/>
         </pc:sldMkLst>
-        <pc:spChg chg="mod">
-          <ac:chgData name="Lines, Todd" userId="afaf7c3a-e8aa-4568-882a-02ad8f9e19b0" providerId="ADAL" clId="{D3357100-C15F-4183-B7DF-9FFD6B364804}" dt="2023-11-02T22:59:08.290" v="784" actId="20577"/>
-          <ac:spMkLst>
-            <pc:docMk/>
-            <pc:sldMk cId="986807166" sldId="1440"/>
-            <ac:spMk id="2" creationId="{00000000-0000-0000-0000-000000000000}"/>
-          </ac:spMkLst>
-        </pc:spChg>
-        <pc:spChg chg="mod">
-          <ac:chgData name="Lines, Todd" userId="afaf7c3a-e8aa-4568-882a-02ad8f9e19b0" providerId="ADAL" clId="{D3357100-C15F-4183-B7DF-9FFD6B364804}" dt="2023-11-02T23:04:13.465" v="837" actId="20577"/>
-          <ac:spMkLst>
-            <pc:docMk/>
-            <pc:sldMk cId="986807166" sldId="1440"/>
-            <ac:spMk id="3" creationId="{00000000-0000-0000-0000-000000000000}"/>
-          </ac:spMkLst>
-        </pc:spChg>
       </pc:sldChg>
       <pc:sldChg chg="addSp delSp modSp new mod">
         <pc:chgData name="Lines, Todd" userId="afaf7c3a-e8aa-4568-882a-02ad8f9e19b0" providerId="ADAL" clId="{D3357100-C15F-4183-B7DF-9FFD6B364804}" dt="2023-11-02T23:13:28.563" v="896" actId="1076"/>
@@ -1014,62 +499,6 @@
           <pc:docMk/>
           <pc:sldMk cId="4176486467" sldId="1441"/>
         </pc:sldMkLst>
-        <pc:spChg chg="mod">
-          <ac:chgData name="Lines, Todd" userId="afaf7c3a-e8aa-4568-882a-02ad8f9e19b0" providerId="ADAL" clId="{D3357100-C15F-4183-B7DF-9FFD6B364804}" dt="2023-11-02T23:11:24.353" v="888" actId="313"/>
-          <ac:spMkLst>
-            <pc:docMk/>
-            <pc:sldMk cId="4176486467" sldId="1441"/>
-            <ac:spMk id="2" creationId="{026C67CC-03E0-B012-E28E-CA8475B59C9E}"/>
-          </ac:spMkLst>
-        </pc:spChg>
-        <pc:spChg chg="del mod">
-          <ac:chgData name="Lines, Todd" userId="afaf7c3a-e8aa-4568-882a-02ad8f9e19b0" providerId="ADAL" clId="{D3357100-C15F-4183-B7DF-9FFD6B364804}" dt="2023-11-02T23:11:13.144" v="886" actId="478"/>
-          <ac:spMkLst>
-            <pc:docMk/>
-            <pc:sldMk cId="4176486467" sldId="1441"/>
-            <ac:spMk id="3" creationId="{AFBA2890-5FC0-165D-97C9-85FE02DA7885}"/>
-          </ac:spMkLst>
-        </pc:spChg>
-        <pc:spChg chg="add mod">
-          <ac:chgData name="Lines, Todd" userId="afaf7c3a-e8aa-4568-882a-02ad8f9e19b0" providerId="ADAL" clId="{D3357100-C15F-4183-B7DF-9FFD6B364804}" dt="2023-11-02T23:10:40.346" v="878" actId="1076"/>
-          <ac:spMkLst>
-            <pc:docMk/>
-            <pc:sldMk cId="4176486467" sldId="1441"/>
-            <ac:spMk id="5" creationId="{D77FA3AA-07AE-17BF-8913-9CB5F43A84EC}"/>
-          </ac:spMkLst>
-        </pc:spChg>
-        <pc:spChg chg="add mod">
-          <ac:chgData name="Lines, Todd" userId="afaf7c3a-e8aa-4568-882a-02ad8f9e19b0" providerId="ADAL" clId="{D3357100-C15F-4183-B7DF-9FFD6B364804}" dt="2023-11-02T23:11:10.803" v="885" actId="1076"/>
-          <ac:spMkLst>
-            <pc:docMk/>
-            <pc:sldMk cId="4176486467" sldId="1441"/>
-            <ac:spMk id="7" creationId="{3A4B5C06-8D7D-4D79-FB2D-AA2C6262FE85}"/>
-          </ac:spMkLst>
-        </pc:spChg>
-        <pc:spChg chg="add del mod">
-          <ac:chgData name="Lines, Todd" userId="afaf7c3a-e8aa-4568-882a-02ad8f9e19b0" providerId="ADAL" clId="{D3357100-C15F-4183-B7DF-9FFD6B364804}" dt="2023-11-02T23:11:16.629" v="887" actId="478"/>
-          <ac:spMkLst>
-            <pc:docMk/>
-            <pc:sldMk cId="4176486467" sldId="1441"/>
-            <ac:spMk id="9" creationId="{FD07ABBB-AE0A-79C1-4201-FBACC75D5FB0}"/>
-          </ac:spMkLst>
-        </pc:spChg>
-        <pc:spChg chg="add mod">
-          <ac:chgData name="Lines, Todd" userId="afaf7c3a-e8aa-4568-882a-02ad8f9e19b0" providerId="ADAL" clId="{D3357100-C15F-4183-B7DF-9FFD6B364804}" dt="2023-11-02T23:13:28.563" v="896" actId="1076"/>
-          <ac:spMkLst>
-            <pc:docMk/>
-            <pc:sldMk cId="4176486467" sldId="1441"/>
-            <ac:spMk id="11" creationId="{88B2C624-AC05-A67D-63A7-525E8EC7F875}"/>
-          </ac:spMkLst>
-        </pc:spChg>
-        <pc:picChg chg="add mod">
-          <ac:chgData name="Lines, Todd" userId="afaf7c3a-e8aa-4568-882a-02ad8f9e19b0" providerId="ADAL" clId="{D3357100-C15F-4183-B7DF-9FFD6B364804}" dt="2023-11-02T23:10:47.186" v="881" actId="1076"/>
-          <ac:picMkLst>
-            <pc:docMk/>
-            <pc:sldMk cId="4176486467" sldId="1441"/>
-            <ac:picMk id="1026" creationId="{56905DCA-D64E-1B95-8230-8BF4A76CDB56}"/>
-          </ac:picMkLst>
-        </pc:picChg>
       </pc:sldChg>
       <pc:sldChg chg="modSp add mod">
         <pc:chgData name="Lines, Todd" userId="afaf7c3a-e8aa-4568-882a-02ad8f9e19b0" providerId="ADAL" clId="{D3357100-C15F-4183-B7DF-9FFD6B364804}" dt="2023-11-02T23:18:04.968" v="967" actId="20577"/>
@@ -1077,14 +506,6 @@
           <pc:docMk/>
           <pc:sldMk cId="3370446629" sldId="1442"/>
         </pc:sldMkLst>
-        <pc:spChg chg="mod">
-          <ac:chgData name="Lines, Todd" userId="afaf7c3a-e8aa-4568-882a-02ad8f9e19b0" providerId="ADAL" clId="{D3357100-C15F-4183-B7DF-9FFD6B364804}" dt="2023-11-02T23:18:04.968" v="967" actId="20577"/>
-          <ac:spMkLst>
-            <pc:docMk/>
-            <pc:sldMk cId="3370446629" sldId="1442"/>
-            <ac:spMk id="3" creationId="{00000000-0000-0000-0000-000000000000}"/>
-          </ac:spMkLst>
-        </pc:spChg>
       </pc:sldChg>
       <pc:sldChg chg="addSp modSp new mod modClrScheme chgLayout">
         <pc:chgData name="Lines, Todd" userId="afaf7c3a-e8aa-4568-882a-02ad8f9e19b0" providerId="ADAL" clId="{D3357100-C15F-4183-B7DF-9FFD6B364804}" dt="2023-11-02T23:26:35.973" v="1305" actId="1076"/>
@@ -1092,30 +513,6 @@
           <pc:docMk/>
           <pc:sldMk cId="2939843722" sldId="1443"/>
         </pc:sldMkLst>
-        <pc:spChg chg="add mod ord">
-          <ac:chgData name="Lines, Todd" userId="afaf7c3a-e8aa-4568-882a-02ad8f9e19b0" providerId="ADAL" clId="{D3357100-C15F-4183-B7DF-9FFD6B364804}" dt="2023-11-02T23:23:55.205" v="983" actId="20577"/>
-          <ac:spMkLst>
-            <pc:docMk/>
-            <pc:sldMk cId="2939843722" sldId="1443"/>
-            <ac:spMk id="3" creationId="{2AD2B779-E2AB-A65B-10A2-D2B078E3FD82}"/>
-          </ac:spMkLst>
-        </pc:spChg>
-        <pc:spChg chg="add mod ord">
-          <ac:chgData name="Lines, Todd" userId="afaf7c3a-e8aa-4568-882a-02ad8f9e19b0" providerId="ADAL" clId="{D3357100-C15F-4183-B7DF-9FFD6B364804}" dt="2023-11-02T23:26:26.968" v="1304" actId="27636"/>
-          <ac:spMkLst>
-            <pc:docMk/>
-            <pc:sldMk cId="2939843722" sldId="1443"/>
-            <ac:spMk id="4" creationId="{9A30506A-D23B-206C-DE3F-D7B20224CB88}"/>
-          </ac:spMkLst>
-        </pc:spChg>
-        <pc:picChg chg="add mod">
-          <ac:chgData name="Lines, Todd" userId="afaf7c3a-e8aa-4568-882a-02ad8f9e19b0" providerId="ADAL" clId="{D3357100-C15F-4183-B7DF-9FFD6B364804}" dt="2023-11-02T23:26:35.973" v="1305" actId="1076"/>
-          <ac:picMkLst>
-            <pc:docMk/>
-            <pc:sldMk cId="2939843722" sldId="1443"/>
-            <ac:picMk id="2" creationId="{960E5086-95B7-2529-3DEC-B325F922E0E3}"/>
-          </ac:picMkLst>
-        </pc:picChg>
       </pc:sldChg>
       <pc:sldChg chg="addSp delSp modSp add mod">
         <pc:chgData name="Lines, Todd" userId="afaf7c3a-e8aa-4568-882a-02ad8f9e19b0" providerId="ADAL" clId="{D3357100-C15F-4183-B7DF-9FFD6B364804}" dt="2023-11-02T23:28:09.076" v="1403" actId="313"/>
@@ -1123,30 +520,6 @@
           <pc:docMk/>
           <pc:sldMk cId="1332880785" sldId="1444"/>
         </pc:sldMkLst>
-        <pc:spChg chg="mod">
-          <ac:chgData name="Lines, Todd" userId="afaf7c3a-e8aa-4568-882a-02ad8f9e19b0" providerId="ADAL" clId="{D3357100-C15F-4183-B7DF-9FFD6B364804}" dt="2023-11-02T23:28:09.076" v="1403" actId="313"/>
-          <ac:spMkLst>
-            <pc:docMk/>
-            <pc:sldMk cId="1332880785" sldId="1444"/>
-            <ac:spMk id="4" creationId="{9A30506A-D23B-206C-DE3F-D7B20224CB88}"/>
-          </ac:spMkLst>
-        </pc:spChg>
-        <pc:picChg chg="del">
-          <ac:chgData name="Lines, Todd" userId="afaf7c3a-e8aa-4568-882a-02ad8f9e19b0" providerId="ADAL" clId="{D3357100-C15F-4183-B7DF-9FFD6B364804}" dt="2023-11-02T23:26:54.473" v="1309" actId="478"/>
-          <ac:picMkLst>
-            <pc:docMk/>
-            <pc:sldMk cId="1332880785" sldId="1444"/>
-            <ac:picMk id="2" creationId="{960E5086-95B7-2529-3DEC-B325F922E0E3}"/>
-          </ac:picMkLst>
-        </pc:picChg>
-        <pc:picChg chg="add mod">
-          <ac:chgData name="Lines, Todd" userId="afaf7c3a-e8aa-4568-882a-02ad8f9e19b0" providerId="ADAL" clId="{D3357100-C15F-4183-B7DF-9FFD6B364804}" dt="2023-11-02T23:26:59.510" v="1313" actId="1076"/>
-          <ac:picMkLst>
-            <pc:docMk/>
-            <pc:sldMk cId="1332880785" sldId="1444"/>
-            <ac:picMk id="5" creationId="{2B992631-81F2-06C2-2511-324BFD2A01D1}"/>
-          </ac:picMkLst>
-        </pc:picChg>
       </pc:sldChg>
       <pc:sldChg chg="addSp delSp modSp add mod">
         <pc:chgData name="Lines, Todd" userId="afaf7c3a-e8aa-4568-882a-02ad8f9e19b0" providerId="ADAL" clId="{D3357100-C15F-4183-B7DF-9FFD6B364804}" dt="2023-11-02T23:30:58.504" v="1708" actId="1076"/>
@@ -1154,30 +527,6 @@
           <pc:docMk/>
           <pc:sldMk cId="2080041333" sldId="1445"/>
         </pc:sldMkLst>
-        <pc:spChg chg="mod">
-          <ac:chgData name="Lines, Todd" userId="afaf7c3a-e8aa-4568-882a-02ad8f9e19b0" providerId="ADAL" clId="{D3357100-C15F-4183-B7DF-9FFD6B364804}" dt="2023-11-02T23:30:42.885" v="1705" actId="20577"/>
-          <ac:spMkLst>
-            <pc:docMk/>
-            <pc:sldMk cId="2080041333" sldId="1445"/>
-            <ac:spMk id="4" creationId="{9A30506A-D23B-206C-DE3F-D7B20224CB88}"/>
-          </ac:spMkLst>
-        </pc:spChg>
-        <pc:picChg chg="add mod modCrop">
-          <ac:chgData name="Lines, Todd" userId="afaf7c3a-e8aa-4568-882a-02ad8f9e19b0" providerId="ADAL" clId="{D3357100-C15F-4183-B7DF-9FFD6B364804}" dt="2023-11-02T23:30:58.504" v="1708" actId="1076"/>
-          <ac:picMkLst>
-            <pc:docMk/>
-            <pc:sldMk cId="2080041333" sldId="1445"/>
-            <ac:picMk id="2" creationId="{DD5C2C62-D648-8A68-F2A0-D785ACAB38C9}"/>
-          </ac:picMkLst>
-        </pc:picChg>
-        <pc:picChg chg="del">
-          <ac:chgData name="Lines, Todd" userId="afaf7c3a-e8aa-4568-882a-02ad8f9e19b0" providerId="ADAL" clId="{D3357100-C15F-4183-B7DF-9FFD6B364804}" dt="2023-11-02T23:28:33.225" v="1405" actId="478"/>
-          <ac:picMkLst>
-            <pc:docMk/>
-            <pc:sldMk cId="2080041333" sldId="1445"/>
-            <ac:picMk id="5" creationId="{2B992631-81F2-06C2-2511-324BFD2A01D1}"/>
-          </ac:picMkLst>
-        </pc:picChg>
       </pc:sldChg>
     </pc:docChg>
   </pc:docChgLst>
@@ -1266,7 +615,7 @@
           <a:p>
             <a:fld id="{564DEA16-27BB-4C42-8376-38DEA3434E03}" type="datetimeFigureOut">
               <a:rPr lang="en-US" smtClean="0"/>
-              <a:t>11/7/2024</a:t>
+              <a:t>10/3/2025</a:t>
             </a:fld>
             <a:endParaRPr lang="en-US"/>
           </a:p>
@@ -1598,7 +947,7 @@
           <a:p>
             <a:fld id="{C8E7CA98-4349-4AC7-9556-8055B2260E5B}" type="slidenum">
               <a:rPr lang="en-US" smtClean="0"/>
-              <a:t>22</a:t>
+              <a:t>23</a:t>
             </a:fld>
             <a:endParaRPr lang="en-US"/>
           </a:p>
@@ -1682,7 +1031,7 @@
           <a:p>
             <a:fld id="{C8E7CA98-4349-4AC7-9556-8055B2260E5B}" type="slidenum">
               <a:rPr lang="en-US" smtClean="0"/>
-              <a:t>23</a:t>
+              <a:t>24</a:t>
             </a:fld>
             <a:endParaRPr lang="en-US"/>
           </a:p>
@@ -1766,7 +1115,7 @@
           <a:p>
             <a:fld id="{C8E7CA98-4349-4AC7-9556-8055B2260E5B}" type="slidenum">
               <a:rPr lang="en-US" smtClean="0"/>
-              <a:t>24</a:t>
+              <a:t>25</a:t>
             </a:fld>
             <a:endParaRPr lang="en-US"/>
           </a:p>
@@ -1850,7 +1199,7 @@
           <a:p>
             <a:fld id="{C8E7CA98-4349-4AC7-9556-8055B2260E5B}" type="slidenum">
               <a:rPr lang="en-US" smtClean="0"/>
-              <a:t>25</a:t>
+              <a:t>26</a:t>
             </a:fld>
             <a:endParaRPr lang="en-US"/>
           </a:p>
@@ -1934,7 +1283,7 @@
           <a:p>
             <a:fld id="{C8E7CA98-4349-4AC7-9556-8055B2260E5B}" type="slidenum">
               <a:rPr lang="en-US" smtClean="0"/>
-              <a:t>26</a:t>
+              <a:t>27</a:t>
             </a:fld>
             <a:endParaRPr lang="en-US"/>
           </a:p>
@@ -2133,7 +1482,7 @@
             <a:fld id="{FF63C9FC-D98D-450F-8666-DAE5A2C35D6D}" type="datetimeFigureOut">
               <a:rPr lang="en-US" smtClean="0"/>
               <a:pPr/>
-              <a:t>11/7/2024</a:t>
+              <a:t>10/3/2025</a:t>
             </a:fld>
             <a:endParaRPr lang="en-US"/>
           </a:p>
@@ -2298,7 +1647,7 @@
             <a:fld id="{FF63C9FC-D98D-450F-8666-DAE5A2C35D6D}" type="datetimeFigureOut">
               <a:rPr lang="en-US" smtClean="0"/>
               <a:pPr/>
-              <a:t>11/7/2024</a:t>
+              <a:t>10/3/2025</a:t>
             </a:fld>
             <a:endParaRPr lang="en-US"/>
           </a:p>
@@ -2473,7 +1822,7 @@
             <a:fld id="{FF63C9FC-D98D-450F-8666-DAE5A2C35D6D}" type="datetimeFigureOut">
               <a:rPr lang="en-US" smtClean="0"/>
               <a:pPr/>
-              <a:t>11/7/2024</a:t>
+              <a:t>10/3/2025</a:t>
             </a:fld>
             <a:endParaRPr lang="en-US"/>
           </a:p>
@@ -2638,7 +1987,7 @@
             <a:fld id="{FF63C9FC-D98D-450F-8666-DAE5A2C35D6D}" type="datetimeFigureOut">
               <a:rPr lang="en-US" smtClean="0"/>
               <a:pPr/>
-              <a:t>11/7/2024</a:t>
+              <a:t>10/3/2025</a:t>
             </a:fld>
             <a:endParaRPr lang="en-US"/>
           </a:p>
@@ -2880,7 +2229,7 @@
             <a:fld id="{FF63C9FC-D98D-450F-8666-DAE5A2C35D6D}" type="datetimeFigureOut">
               <a:rPr lang="en-US" smtClean="0"/>
               <a:pPr/>
-              <a:t>11/7/2024</a:t>
+              <a:t>10/3/2025</a:t>
             </a:fld>
             <a:endParaRPr lang="en-US"/>
           </a:p>
@@ -3162,7 +2511,7 @@
             <a:fld id="{FF63C9FC-D98D-450F-8666-DAE5A2C35D6D}" type="datetimeFigureOut">
               <a:rPr lang="en-US" smtClean="0"/>
               <a:pPr/>
-              <a:t>11/7/2024</a:t>
+              <a:t>10/3/2025</a:t>
             </a:fld>
             <a:endParaRPr lang="en-US"/>
           </a:p>
@@ -3578,7 +2927,7 @@
             <a:fld id="{FF63C9FC-D98D-450F-8666-DAE5A2C35D6D}" type="datetimeFigureOut">
               <a:rPr lang="en-US" smtClean="0"/>
               <a:pPr/>
-              <a:t>11/7/2024</a:t>
+              <a:t>10/3/2025</a:t>
             </a:fld>
             <a:endParaRPr lang="en-US"/>
           </a:p>
@@ -3692,7 +3041,7 @@
             <a:fld id="{FF63C9FC-D98D-450F-8666-DAE5A2C35D6D}" type="datetimeFigureOut">
               <a:rPr lang="en-US" smtClean="0"/>
               <a:pPr/>
-              <a:t>11/7/2024</a:t>
+              <a:t>10/3/2025</a:t>
             </a:fld>
             <a:endParaRPr lang="en-US"/>
           </a:p>
@@ -3784,7 +3133,7 @@
             <a:fld id="{FF63C9FC-D98D-450F-8666-DAE5A2C35D6D}" type="datetimeFigureOut">
               <a:rPr lang="en-US" smtClean="0"/>
               <a:pPr/>
-              <a:t>11/7/2024</a:t>
+              <a:t>10/3/2025</a:t>
             </a:fld>
             <a:endParaRPr lang="en-US"/>
           </a:p>
@@ -4056,7 +3405,7 @@
             <a:fld id="{FF63C9FC-D98D-450F-8666-DAE5A2C35D6D}" type="datetimeFigureOut">
               <a:rPr lang="en-US" smtClean="0"/>
               <a:pPr/>
-              <a:t>11/7/2024</a:t>
+              <a:t>10/3/2025</a:t>
             </a:fld>
             <a:endParaRPr lang="en-US"/>
           </a:p>
@@ -4305,7 +3654,7 @@
             <a:fld id="{FF63C9FC-D98D-450F-8666-DAE5A2C35D6D}" type="datetimeFigureOut">
               <a:rPr lang="en-US" smtClean="0"/>
               <a:pPr/>
-              <a:t>11/7/2024</a:t>
+              <a:t>10/3/2025</a:t>
             </a:fld>
             <a:endParaRPr lang="en-US"/>
           </a:p>
@@ -4513,7 +3862,7 @@
             <a:fld id="{FF63C9FC-D98D-450F-8666-DAE5A2C35D6D}" type="datetimeFigureOut">
               <a:rPr lang="en-US" smtClean="0"/>
               <a:pPr/>
-              <a:t>11/7/2024</a:t>
+              <a:t>10/3/2025</a:t>
             </a:fld>
             <a:endParaRPr lang="en-US"/>
           </a:p>
@@ -8282,8 +7631,8 @@
           </a:p>
         </p:txBody>
       </p:sp>
-      <mc:AlternateContent xmlns:mc="http://schemas.openxmlformats.org/markup-compatibility/2006">
-        <mc:Choice xmlns:a14="http://schemas.microsoft.com/office/drawing/2010/main" Requires="a14">
+      <mc:AlternateContent xmlns:mc="http://schemas.openxmlformats.org/markup-compatibility/2006" xmlns:a14="http://schemas.microsoft.com/office/drawing/2010/main">
+        <mc:Choice Requires="a14">
           <p:sp>
             <p:nvSpPr>
               <p:cNvPr id="3" name="Content Placeholder 2"/>
@@ -8820,7 +8169,7 @@
             </p:txBody>
           </p:sp>
         </mc:Choice>
-        <mc:Fallback>
+        <mc:Fallback xmlns="">
           <p:sp>
             <p:nvSpPr>
               <p:cNvPr id="3" name="Content Placeholder 2"/>
@@ -11467,8 +10816,8 @@
           </a:p>
         </p:txBody>
       </p:sp>
-      <mc:AlternateContent xmlns:mc="http://schemas.openxmlformats.org/markup-compatibility/2006">
-        <mc:Choice xmlns:a14="http://schemas.microsoft.com/office/drawing/2010/main" Requires="a14">
+      <mc:AlternateContent xmlns:mc="http://schemas.openxmlformats.org/markup-compatibility/2006" xmlns:a14="http://schemas.microsoft.com/office/drawing/2010/main">
+        <mc:Choice Requires="a14">
           <p:sp>
             <p:nvSpPr>
               <p:cNvPr id="3" name="Content Placeholder 2"/>
@@ -11861,7 +11210,7 @@
             </p:txBody>
           </p:sp>
         </mc:Choice>
-        <mc:Fallback>
+        <mc:Fallback xmlns="">
           <p:sp>
             <p:nvSpPr>
               <p:cNvPr id="3" name="Content Placeholder 2"/>
@@ -16115,7 +15464,7 @@
             </a:pPr>
             <a:r>
               <a:rPr lang="en-US" dirty="0"/>
-              <a:t>It mechanically transports charge on it’s belt</a:t>
+              <a:t>It mechanically transports charge on its belt</a:t>
             </a:r>
           </a:p>
           <a:p>
@@ -16293,7 +15642,7 @@
           <a:p>
             <a:r>
               <a:rPr lang="en-US" dirty="0"/>
-              <a:t>Question 223.32.5</a:t>
+              <a:t>Question 223.32.6</a:t>
             </a:r>
           </a:p>
         </p:txBody>
@@ -16310,17 +15659,15 @@
         </p:nvSpPr>
         <p:spPr/>
         <p:txBody>
-          <a:bodyPr>
-            <a:normAutofit lnSpcReduction="10000"/>
-          </a:bodyPr>
+          <a:bodyPr/>
           <a:lstStyle/>
           <a:p>
-            <a:pPr marL="0" indent="0">
+            <a:pPr>
               <a:buNone/>
             </a:pPr>
             <a:r>
               <a:rPr lang="en-US" dirty="0"/>
-              <a:t>How does a battery separate charge?</a:t>
+              <a:t>Your nervous system needs sodium ions to work as charge carriers. How do you get sodium ions in the body?</a:t>
             </a:r>
           </a:p>
           <a:p>
@@ -16330,7 +15677,7 @@
             </a:pPr>
             <a:r>
               <a:rPr lang="en-US" dirty="0"/>
-              <a:t>There is a small charge pump that separates the charge</a:t>
+              <a:t>You eat salt, and the water molecules in your body split up the sodium and the chlorine.</a:t>
             </a:r>
           </a:p>
           <a:p>
@@ -16340,7 +15687,7 @@
             </a:pPr>
             <a:r>
               <a:rPr lang="en-US" dirty="0"/>
-              <a:t>There is a strong static charge that attracts the moving charge in the wires</a:t>
+              <a:t>You have an internal electrolysis system that splits up molecules using high voltages </a:t>
             </a:r>
           </a:p>
           <a:p>
@@ -16350,7 +15697,7 @@
             </a:pPr>
             <a:r>
               <a:rPr lang="en-US" dirty="0"/>
-              <a:t>There is an electro-chemical reaction that separates charge</a:t>
+              <a:t>You are born with a large positive charge</a:t>
             </a:r>
           </a:p>
           <a:p>
@@ -16358,10 +15705,7 @@
               <a:buFont typeface="+mj-lt"/>
               <a:buAutoNum type="alphaLcParenR"/>
             </a:pPr>
-            <a:r>
-              <a:rPr lang="en-US" dirty="0"/>
-              <a:t>Batteries don’t separate charge, they create voltage</a:t>
-            </a:r>
+            <a:endParaRPr lang="en-US" dirty="0"/>
           </a:p>
         </p:txBody>
       </p:sp>
@@ -16390,16 +15734,11 @@
               </a:pPr>
               <a:t>19</a:t>
             </a:fld>
-            <a:endParaRPr lang="en-US"/>
+            <a:endParaRPr lang="en-US" dirty="0"/>
           </a:p>
         </p:txBody>
       </p:sp>
     </p:spTree>
-    <p:extLst>
-      <p:ext uri="{BB962C8B-B14F-4D97-AF65-F5344CB8AC3E}">
-        <p14:creationId xmlns:p14="http://schemas.microsoft.com/office/powerpoint/2010/main" val="2367440458"/>
-      </p:ext>
-    </p:extLst>
   </p:cSld>
   <p:clrMapOvr>
     <a:masterClrMapping/>
@@ -16556,6 +15895,154 @@
 </file>
 
 <file path=ppt/slides/slide20.xml><?xml version="1.0" encoding="utf-8"?>
+<p:sld xmlns:a="http://schemas.openxmlformats.org/drawingml/2006/main" xmlns:r="http://schemas.openxmlformats.org/officeDocument/2006/relationships" xmlns:p="http://schemas.openxmlformats.org/presentationml/2006/main">
+  <p:cSld>
+    <p:spTree>
+      <p:nvGrpSpPr>
+        <p:cNvPr id="1" name=""/>
+        <p:cNvGrpSpPr/>
+        <p:nvPr/>
+      </p:nvGrpSpPr>
+      <p:grpSpPr>
+        <a:xfrm>
+          <a:off x="0" y="0"/>
+          <a:ext cx="0" cy="0"/>
+          <a:chOff x="0" y="0"/>
+          <a:chExt cx="0" cy="0"/>
+        </a:xfrm>
+      </p:grpSpPr>
+      <p:sp>
+        <p:nvSpPr>
+          <p:cNvPr id="2" name="Title 1"/>
+          <p:cNvSpPr>
+            <a:spLocks noGrp="1"/>
+          </p:cNvSpPr>
+          <p:nvPr>
+            <p:ph type="title"/>
+          </p:nvPr>
+        </p:nvSpPr>
+        <p:spPr/>
+        <p:txBody>
+          <a:bodyPr/>
+          <a:lstStyle/>
+          <a:p>
+            <a:r>
+              <a:rPr lang="en-US" dirty="0"/>
+              <a:t>Question 223.32.5</a:t>
+            </a:r>
+          </a:p>
+        </p:txBody>
+      </p:sp>
+      <p:sp>
+        <p:nvSpPr>
+          <p:cNvPr id="3" name="Content Placeholder 2"/>
+          <p:cNvSpPr>
+            <a:spLocks noGrp="1"/>
+          </p:cNvSpPr>
+          <p:nvPr>
+            <p:ph idx="1"/>
+          </p:nvPr>
+        </p:nvSpPr>
+        <p:spPr/>
+        <p:txBody>
+          <a:bodyPr>
+            <a:normAutofit lnSpcReduction="10000"/>
+          </a:bodyPr>
+          <a:lstStyle/>
+          <a:p>
+            <a:pPr marL="0" indent="0">
+              <a:buNone/>
+            </a:pPr>
+            <a:r>
+              <a:rPr lang="en-US" dirty="0"/>
+              <a:t>How does a battery separate charge?</a:t>
+            </a:r>
+          </a:p>
+          <a:p>
+            <a:pPr marL="514350" indent="-514350">
+              <a:buFont typeface="+mj-lt"/>
+              <a:buAutoNum type="alphaLcParenR"/>
+            </a:pPr>
+            <a:r>
+              <a:rPr lang="en-US" dirty="0"/>
+              <a:t>There is a small charge pump that separates the charge</a:t>
+            </a:r>
+          </a:p>
+          <a:p>
+            <a:pPr marL="514350" indent="-514350">
+              <a:buFont typeface="+mj-lt"/>
+              <a:buAutoNum type="alphaLcParenR"/>
+            </a:pPr>
+            <a:r>
+              <a:rPr lang="en-US" dirty="0"/>
+              <a:t>There is a strong static charge that attracts the moving charge in the wires</a:t>
+            </a:r>
+          </a:p>
+          <a:p>
+            <a:pPr marL="514350" indent="-514350">
+              <a:buFont typeface="+mj-lt"/>
+              <a:buAutoNum type="alphaLcParenR"/>
+            </a:pPr>
+            <a:r>
+              <a:rPr lang="en-US" dirty="0"/>
+              <a:t>There is an electro-chemical reaction that separates charge</a:t>
+            </a:r>
+          </a:p>
+          <a:p>
+            <a:pPr marL="514350" indent="-514350">
+              <a:buFont typeface="+mj-lt"/>
+              <a:buAutoNum type="alphaLcParenR"/>
+            </a:pPr>
+            <a:r>
+              <a:rPr lang="en-US" dirty="0"/>
+              <a:t>Batteries don’t separate charge, they create voltage</a:t>
+            </a:r>
+          </a:p>
+        </p:txBody>
+      </p:sp>
+      <p:sp>
+        <p:nvSpPr>
+          <p:cNvPr id="4" name="Slide Number Placeholder 3"/>
+          <p:cNvSpPr>
+            <a:spLocks noGrp="1"/>
+          </p:cNvSpPr>
+          <p:nvPr>
+            <p:ph type="sldNum" sz="quarter" idx="12"/>
+          </p:nvPr>
+        </p:nvSpPr>
+        <p:spPr/>
+        <p:txBody>
+          <a:bodyPr/>
+          <a:lstStyle/>
+          <a:p>
+            <a:pPr>
+              <a:defRPr/>
+            </a:pPr>
+            <a:fld id="{64137B81-8888-4253-92EC-0AED2A590749}" type="slidenum">
+              <a:rPr lang="en-US" smtClean="0"/>
+              <a:pPr>
+                <a:defRPr/>
+              </a:pPr>
+              <a:t>20</a:t>
+            </a:fld>
+            <a:endParaRPr lang="en-US"/>
+          </a:p>
+        </p:txBody>
+      </p:sp>
+    </p:spTree>
+    <p:extLst>
+      <p:ext uri="{BB962C8B-B14F-4D97-AF65-F5344CB8AC3E}">
+        <p14:creationId xmlns:p14="http://schemas.microsoft.com/office/powerpoint/2010/main" val="2367440458"/>
+      </p:ext>
+    </p:extLst>
+  </p:cSld>
+  <p:clrMapOvr>
+    <a:masterClrMapping/>
+  </p:clrMapOvr>
+</p:sld>
+</file>
+
+<file path=ppt/slides/slide21.xml><?xml version="1.0" encoding="utf-8"?>
 <p:sld xmlns:a="http://schemas.openxmlformats.org/drawingml/2006/main" xmlns:r="http://schemas.openxmlformats.org/officeDocument/2006/relationships" xmlns:p="http://schemas.openxmlformats.org/presentationml/2006/main">
   <p:cSld>
     <p:spTree>
@@ -17169,7 +16656,7 @@
 </p:sld>
 </file>
 
-<file path=ppt/slides/slide21.xml><?xml version="1.0" encoding="utf-8"?>
+<file path=ppt/slides/slide22.xml><?xml version="1.0" encoding="utf-8"?>
 <p:sld xmlns:a="http://schemas.openxmlformats.org/drawingml/2006/main" xmlns:r="http://schemas.openxmlformats.org/officeDocument/2006/relationships" xmlns:p="http://schemas.openxmlformats.org/presentationml/2006/main">
   <p:cSld>
     <p:spTree>
@@ -18094,7 +17581,7 @@
 </p:sld>
 </file>
 
-<file path=ppt/slides/slide22.xml><?xml version="1.0" encoding="utf-8"?>
+<file path=ppt/slides/slide23.xml><?xml version="1.0" encoding="utf-8"?>
 <p:sld xmlns:a="http://schemas.openxmlformats.org/drawingml/2006/main" xmlns:r="http://schemas.openxmlformats.org/officeDocument/2006/relationships" xmlns:p="http://schemas.openxmlformats.org/presentationml/2006/main">
   <p:cSld>
     <p:spTree>
@@ -18982,7 +18469,7 @@
         </p:nvGrpSpPr>
         <p:grpSpPr>
           <a:xfrm>
-            <a:off x="5465288" y="4863777"/>
+            <a:off x="5375966" y="4975860"/>
             <a:ext cx="559769" cy="609600"/>
             <a:chOff x="3623788" y="4057153"/>
             <a:chExt cx="559769" cy="609600"/>
@@ -19354,7 +18841,7 @@
 </p:sld>
 </file>
 
-<file path=ppt/slides/slide23.xml><?xml version="1.0" encoding="utf-8"?>
+<file path=ppt/slides/slide24.xml><?xml version="1.0" encoding="utf-8"?>
 <p:sld xmlns:a="http://schemas.openxmlformats.org/drawingml/2006/main" xmlns:r="http://schemas.openxmlformats.org/officeDocument/2006/relationships" xmlns:p="http://schemas.openxmlformats.org/presentationml/2006/main">
   <p:cSld>
     <p:spTree>
@@ -21698,7 +21185,7 @@
 </p:sld>
 </file>
 
-<file path=ppt/slides/slide24.xml><?xml version="1.0" encoding="utf-8"?>
+<file path=ppt/slides/slide25.xml><?xml version="1.0" encoding="utf-8"?>
 <p:sld xmlns:a="http://schemas.openxmlformats.org/drawingml/2006/main" xmlns:r="http://schemas.openxmlformats.org/officeDocument/2006/relationships" xmlns:p="http://schemas.openxmlformats.org/presentationml/2006/main">
   <p:cSld>
     <p:spTree>
@@ -23903,7 +23390,7 @@
 </p:sld>
 </file>
 
-<file path=ppt/slides/slide25.xml><?xml version="1.0" encoding="utf-8"?>
+<file path=ppt/slides/slide26.xml><?xml version="1.0" encoding="utf-8"?>
 <p:sld xmlns:a="http://schemas.openxmlformats.org/drawingml/2006/main" xmlns:r="http://schemas.openxmlformats.org/officeDocument/2006/relationships" xmlns:p="http://schemas.openxmlformats.org/presentationml/2006/main">
   <p:cSld>
     <p:spTree>
@@ -23928,7 +23415,7 @@
         </p:nvSpPr>
         <p:spPr>
           <a:xfrm>
-            <a:off x="1408816" y="658870"/>
+            <a:off x="1396763" y="658869"/>
             <a:ext cx="6109252" cy="5589117"/>
           </a:xfrm>
           <a:prstGeom prst="rect">
@@ -26156,6 +25643,95 @@
           </a:fontRef>
         </p:style>
       </p:cxnSp>
+      <p:cxnSp>
+        <p:nvCxnSpPr>
+          <p:cNvPr id="5" name="Straight Arrow Connector 4">
+            <a:extLst>
+              <a:ext uri="{FF2B5EF4-FFF2-40B4-BE49-F238E27FC236}">
+                <a16:creationId xmlns:a16="http://schemas.microsoft.com/office/drawing/2014/main" id="{F2FE13F7-3B90-8D11-8AAD-AC752FE2A3A9}"/>
+              </a:ext>
+            </a:extLst>
+          </p:cNvPr>
+          <p:cNvCxnSpPr>
+            <a:cxnSpLocks/>
+          </p:cNvCxnSpPr>
+          <p:nvPr/>
+        </p:nvCxnSpPr>
+        <p:spPr>
+          <a:xfrm flipH="1" flipV="1">
+            <a:off x="7086504" y="4325010"/>
+            <a:ext cx="172327" cy="144724"/>
+          </a:xfrm>
+          <a:prstGeom prst="straightConnector1">
+            <a:avLst/>
+          </a:prstGeom>
+          <a:ln w="28575">
+            <a:solidFill>
+              <a:srgbClr val="FF0000"/>
+            </a:solidFill>
+            <a:tailEnd type="arrow"/>
+          </a:ln>
+        </p:spPr>
+        <p:style>
+          <a:lnRef idx="1">
+            <a:schemeClr val="accent1"/>
+          </a:lnRef>
+          <a:fillRef idx="0">
+            <a:schemeClr val="accent1"/>
+          </a:fillRef>
+          <a:effectRef idx="0">
+            <a:schemeClr val="accent1"/>
+          </a:effectRef>
+          <a:fontRef idx="minor">
+            <a:schemeClr val="tx1"/>
+          </a:fontRef>
+        </p:style>
+      </p:cxnSp>
+      <p:cxnSp>
+        <p:nvCxnSpPr>
+          <p:cNvPr id="11" name="Straight Arrow Connector 10">
+            <a:extLst>
+              <a:ext uri="{FF2B5EF4-FFF2-40B4-BE49-F238E27FC236}">
+                <a16:creationId xmlns:a16="http://schemas.microsoft.com/office/drawing/2014/main" id="{FB962E97-8433-37AA-5885-52B0F950483D}"/>
+              </a:ext>
+            </a:extLst>
+          </p:cNvPr>
+          <p:cNvCxnSpPr>
+            <a:cxnSpLocks/>
+            <a:endCxn id="93" idx="7"/>
+          </p:cNvCxnSpPr>
+          <p:nvPr/>
+        </p:nvCxnSpPr>
+        <p:spPr>
+          <a:xfrm flipH="1">
+            <a:off x="7014936" y="3911513"/>
+            <a:ext cx="243895" cy="73760"/>
+          </a:xfrm>
+          <a:prstGeom prst="straightConnector1">
+            <a:avLst/>
+          </a:prstGeom>
+          <a:ln w="28575">
+            <a:solidFill>
+              <a:srgbClr val="FF0000"/>
+            </a:solidFill>
+            <a:tailEnd type="arrow"/>
+          </a:ln>
+        </p:spPr>
+        <p:style>
+          <a:lnRef idx="1">
+            <a:schemeClr val="accent1"/>
+          </a:lnRef>
+          <a:fillRef idx="0">
+            <a:schemeClr val="accent1"/>
+          </a:fillRef>
+          <a:effectRef idx="0">
+            <a:schemeClr val="accent1"/>
+          </a:effectRef>
+          <a:fontRef idx="minor">
+            <a:schemeClr val="tx1"/>
+          </a:fontRef>
+        </p:style>
+      </p:cxnSp>
     </p:spTree>
     <p:extLst>
       <p:ext uri="{BB962C8B-B14F-4D97-AF65-F5344CB8AC3E}">
@@ -26169,7 +25745,7 @@
 </p:sld>
 </file>
 
-<file path=ppt/slides/slide26.xml><?xml version="1.0" encoding="utf-8"?>
+<file path=ppt/slides/slide27.xml><?xml version="1.0" encoding="utf-8"?>
 <p:sld xmlns:a="http://schemas.openxmlformats.org/drawingml/2006/main" xmlns:r="http://schemas.openxmlformats.org/officeDocument/2006/relationships" xmlns:p="http://schemas.openxmlformats.org/presentationml/2006/main">
   <p:cSld>
     <p:spTree>
@@ -27779,7 +27355,7 @@
 </p:sld>
 </file>
 
-<file path=ppt/slides/slide27.xml><?xml version="1.0" encoding="utf-8"?>
+<file path=ppt/slides/slide28.xml><?xml version="1.0" encoding="utf-8"?>
 <p:sld xmlns:a="http://schemas.openxmlformats.org/drawingml/2006/main" xmlns:r="http://schemas.openxmlformats.org/officeDocument/2006/relationships" xmlns:p="http://schemas.openxmlformats.org/presentationml/2006/main">
   <p:cSld>
     <p:spTree>
@@ -31629,7 +31205,7 @@
 </p:sld>
 </file>
 
-<file path=ppt/slides/slide28.xml><?xml version="1.0" encoding="utf-8"?>
+<file path=ppt/slides/slide29.xml><?xml version="1.0" encoding="utf-8"?>
 <p:sld xmlns:a="http://schemas.openxmlformats.org/drawingml/2006/main" xmlns:r="http://schemas.openxmlformats.org/officeDocument/2006/relationships" xmlns:p="http://schemas.openxmlformats.org/presentationml/2006/main">
   <p:cSld>
     <p:spTree>
@@ -31992,64 +31568,6 @@
 </p:sld>
 </file>
 
-<file path=ppt/slides/slide29.xml><?xml version="1.0" encoding="utf-8"?>
-<p:sld xmlns:a="http://schemas.openxmlformats.org/drawingml/2006/main" xmlns:r="http://schemas.openxmlformats.org/officeDocument/2006/relationships" xmlns:p="http://schemas.openxmlformats.org/presentationml/2006/main">
-  <p:cSld>
-    <p:spTree>
-      <p:nvGrpSpPr>
-        <p:cNvPr id="1" name=""/>
-        <p:cNvGrpSpPr/>
-        <p:nvPr/>
-      </p:nvGrpSpPr>
-      <p:grpSpPr>
-        <a:xfrm>
-          <a:off x="0" y="0"/>
-          <a:ext cx="0" cy="0"/>
-          <a:chOff x="0" y="0"/>
-          <a:chExt cx="0" cy="0"/>
-        </a:xfrm>
-      </p:grpSpPr>
-      <p:pic>
-        <p:nvPicPr>
-          <p:cNvPr id="2050" name="Picture 2"/>
-          <p:cNvPicPr>
-            <a:picLocks noChangeAspect="1" noChangeArrowheads="1"/>
-          </p:cNvPicPr>
-          <p:nvPr/>
-        </p:nvPicPr>
-        <p:blipFill>
-          <a:blip r:embed="rId2" cstate="print"/>
-          <a:srcRect/>
-          <a:stretch>
-            <a:fillRect/>
-          </a:stretch>
-        </p:blipFill>
-        <p:spPr bwMode="auto">
-          <a:xfrm>
-            <a:off x="171450" y="1812925"/>
-            <a:ext cx="8801100" cy="3238500"/>
-          </a:xfrm>
-          <a:prstGeom prst="rect">
-            <a:avLst/>
-          </a:prstGeom>
-          <a:noFill/>
-          <a:ln w="9525">
-            <a:noFill/>
-            <a:miter lim="800000"/>
-            <a:headEnd/>
-            <a:tailEnd/>
-          </a:ln>
-          <a:effectLst/>
-        </p:spPr>
-      </p:pic>
-    </p:spTree>
-  </p:cSld>
-  <p:clrMapOvr>
-    <a:masterClrMapping/>
-  </p:clrMapOvr>
-</p:sld>
-</file>
-
 <file path=ppt/slides/slide3.xml><?xml version="1.0" encoding="utf-8"?>
 <p:sld xmlns:a="http://schemas.openxmlformats.org/drawingml/2006/main" xmlns:r="http://schemas.openxmlformats.org/officeDocument/2006/relationships" xmlns:p="http://schemas.openxmlformats.org/presentationml/2006/main">
   <p:cSld>
@@ -32205,6 +31723,64 @@
       </p:grpSpPr>
       <p:pic>
         <p:nvPicPr>
+          <p:cNvPr id="2050" name="Picture 2"/>
+          <p:cNvPicPr>
+            <a:picLocks noChangeAspect="1" noChangeArrowheads="1"/>
+          </p:cNvPicPr>
+          <p:nvPr/>
+        </p:nvPicPr>
+        <p:blipFill>
+          <a:blip r:embed="rId2" cstate="print"/>
+          <a:srcRect/>
+          <a:stretch>
+            <a:fillRect/>
+          </a:stretch>
+        </p:blipFill>
+        <p:spPr bwMode="auto">
+          <a:xfrm>
+            <a:off x="171450" y="1812925"/>
+            <a:ext cx="8801100" cy="3238500"/>
+          </a:xfrm>
+          <a:prstGeom prst="rect">
+            <a:avLst/>
+          </a:prstGeom>
+          <a:noFill/>
+          <a:ln w="9525">
+            <a:noFill/>
+            <a:miter lim="800000"/>
+            <a:headEnd/>
+            <a:tailEnd/>
+          </a:ln>
+          <a:effectLst/>
+        </p:spPr>
+      </p:pic>
+    </p:spTree>
+  </p:cSld>
+  <p:clrMapOvr>
+    <a:masterClrMapping/>
+  </p:clrMapOvr>
+</p:sld>
+</file>
+
+<file path=ppt/slides/slide31.xml><?xml version="1.0" encoding="utf-8"?>
+<p:sld xmlns:a="http://schemas.openxmlformats.org/drawingml/2006/main" xmlns:r="http://schemas.openxmlformats.org/officeDocument/2006/relationships" xmlns:p="http://schemas.openxmlformats.org/presentationml/2006/main">
+  <p:cSld>
+    <p:spTree>
+      <p:nvGrpSpPr>
+        <p:cNvPr id="1" name=""/>
+        <p:cNvGrpSpPr/>
+        <p:nvPr/>
+      </p:nvGrpSpPr>
+      <p:grpSpPr>
+        <a:xfrm>
+          <a:off x="0" y="0"/>
+          <a:ext cx="0" cy="0"/>
+          <a:chOff x="0" y="0"/>
+          <a:chExt cx="0" cy="0"/>
+        </a:xfrm>
+      </p:grpSpPr>
+      <p:pic>
+        <p:nvPicPr>
           <p:cNvPr id="50177" name="Picture 1"/>
           <p:cNvPicPr>
             <a:picLocks noChangeAspect="1" noChangeArrowheads="1"/>
@@ -32244,7 +31820,7 @@
 </p:sld>
 </file>
 
-<file path=ppt/slides/slide31.xml><?xml version="1.0" encoding="utf-8"?>
+<file path=ppt/slides/slide32.xml><?xml version="1.0" encoding="utf-8"?>
 <p:sld xmlns:a="http://schemas.openxmlformats.org/drawingml/2006/main" xmlns:r="http://schemas.openxmlformats.org/officeDocument/2006/relationships" xmlns:p="http://schemas.openxmlformats.org/presentationml/2006/main">
   <p:cSld>
     <p:spTree>
@@ -32302,7 +31878,7 @@
 </p:sld>
 </file>
 
-<file path=ppt/slides/slide32.xml><?xml version="1.0" encoding="utf-8"?>
+<file path=ppt/slides/slide33.xml><?xml version="1.0" encoding="utf-8"?>
 <p:sld xmlns:a="http://schemas.openxmlformats.org/drawingml/2006/main" xmlns:r="http://schemas.openxmlformats.org/officeDocument/2006/relationships" xmlns:p="http://schemas.openxmlformats.org/presentationml/2006/main">
   <p:cSld>
     <p:spTree>
@@ -32481,7 +32057,7 @@
 </p:sld>
 </file>
 
-<file path=ppt/slides/slide33.xml><?xml version="1.0" encoding="utf-8"?>
+<file path=ppt/slides/slide34.xml><?xml version="1.0" encoding="utf-8"?>
 <p:sld xmlns:a="http://schemas.openxmlformats.org/drawingml/2006/main" xmlns:r="http://schemas.openxmlformats.org/officeDocument/2006/relationships" xmlns:p="http://schemas.openxmlformats.org/presentationml/2006/main">
   <p:cSld>
     <p:spTree>
@@ -32660,7 +32236,7 @@
 </p:sld>
 </file>
 
-<file path=ppt/slides/slide34.xml><?xml version="1.0" encoding="utf-8"?>
+<file path=ppt/slides/slide35.xml><?xml version="1.0" encoding="utf-8"?>
 <p:sld xmlns:a="http://schemas.openxmlformats.org/drawingml/2006/main" xmlns:r="http://schemas.openxmlformats.org/officeDocument/2006/relationships" xmlns:p="http://schemas.openxmlformats.org/presentationml/2006/main">
   <p:cSld>
     <p:spTree>
@@ -32841,7 +32417,7 @@
 </p:sld>
 </file>
 
-<file path=ppt/slides/slide35.xml><?xml version="1.0" encoding="utf-8"?>
+<file path=ppt/slides/slide36.xml><?xml version="1.0" encoding="utf-8"?>
 <p:sld xmlns:a="http://schemas.openxmlformats.org/drawingml/2006/main" xmlns:r="http://schemas.openxmlformats.org/officeDocument/2006/relationships" xmlns:p="http://schemas.openxmlformats.org/presentationml/2006/main">
   <p:cSld>
     <p:spTree>
@@ -32899,7 +32475,7 @@
 </p:sld>
 </file>
 
-<file path=ppt/slides/slide36.xml><?xml version="1.0" encoding="utf-8"?>
+<file path=ppt/slides/slide37.xml><?xml version="1.0" encoding="utf-8"?>
 <p:sld xmlns:a="http://schemas.openxmlformats.org/drawingml/2006/main" xmlns:r="http://schemas.openxmlformats.org/officeDocument/2006/relationships" xmlns:p="http://schemas.openxmlformats.org/presentationml/2006/main">
   <p:cSld>
     <p:spTree>
@@ -32957,7 +32533,7 @@
 </p:sld>
 </file>
 
-<file path=ppt/slides/slide37.xml><?xml version="1.0" encoding="utf-8"?>
+<file path=ppt/slides/slide38.xml><?xml version="1.0" encoding="utf-8"?>
 <p:sld xmlns:a="http://schemas.openxmlformats.org/drawingml/2006/main" xmlns:r="http://schemas.openxmlformats.org/officeDocument/2006/relationships" xmlns:p="http://schemas.openxmlformats.org/presentationml/2006/main">
   <p:cSld>
     <p:spTree>
@@ -34346,7 +33922,7 @@
 </p:sld>
 </file>
 
-<file path=ppt/slides/slide38.xml><?xml version="1.0" encoding="utf-8"?>
+<file path=ppt/slides/slide39.xml><?xml version="1.0" encoding="utf-8"?>
 <p:sld xmlns:a="http://schemas.openxmlformats.org/drawingml/2006/main" xmlns:r="http://schemas.openxmlformats.org/officeDocument/2006/relationships" xmlns:p="http://schemas.openxmlformats.org/presentationml/2006/main">
   <p:cSld>
     <p:spTree>
@@ -35408,97 +34984,6 @@
 </p:sld>
 </file>
 
-<file path=ppt/slides/slide39.xml><?xml version="1.0" encoding="utf-8"?>
-<p:sld xmlns:a="http://schemas.openxmlformats.org/drawingml/2006/main" xmlns:r="http://schemas.openxmlformats.org/officeDocument/2006/relationships" xmlns:p="http://schemas.openxmlformats.org/presentationml/2006/main">
-  <p:cSld>
-    <p:spTree>
-      <p:nvGrpSpPr>
-        <p:cNvPr id="1" name=""/>
-        <p:cNvGrpSpPr/>
-        <p:nvPr/>
-      </p:nvGrpSpPr>
-      <p:grpSpPr>
-        <a:xfrm>
-          <a:off x="0" y="0"/>
-          <a:ext cx="0" cy="0"/>
-          <a:chOff x="0" y="0"/>
-          <a:chExt cx="0" cy="0"/>
-        </a:xfrm>
-      </p:grpSpPr>
-      <p:pic>
-        <p:nvPicPr>
-          <p:cNvPr id="7170" name="Picture 2"/>
-          <p:cNvPicPr>
-            <a:picLocks noChangeAspect="1" noChangeArrowheads="1"/>
-          </p:cNvPicPr>
-          <p:nvPr/>
-        </p:nvPicPr>
-        <p:blipFill>
-          <a:blip r:embed="rId2" cstate="print"/>
-          <a:srcRect/>
-          <a:stretch>
-            <a:fillRect/>
-          </a:stretch>
-        </p:blipFill>
-        <p:spPr bwMode="auto">
-          <a:xfrm>
-            <a:off x="4958503" y="792870"/>
-            <a:ext cx="4185497" cy="2864729"/>
-          </a:xfrm>
-          <a:prstGeom prst="rect">
-            <a:avLst/>
-          </a:prstGeom>
-          <a:noFill/>
-          <a:ln w="9525">
-            <a:noFill/>
-            <a:miter lim="800000"/>
-            <a:headEnd/>
-            <a:tailEnd/>
-          </a:ln>
-          <a:effectLst/>
-        </p:spPr>
-      </p:pic>
-      <p:pic>
-        <p:nvPicPr>
-          <p:cNvPr id="7171" name="Picture 3"/>
-          <p:cNvPicPr>
-            <a:picLocks noChangeAspect="1" noChangeArrowheads="1"/>
-          </p:cNvPicPr>
-          <p:nvPr/>
-        </p:nvPicPr>
-        <p:blipFill>
-          <a:blip r:embed="rId3" cstate="print"/>
-          <a:srcRect/>
-          <a:stretch>
-            <a:fillRect/>
-          </a:stretch>
-        </p:blipFill>
-        <p:spPr bwMode="auto">
-          <a:xfrm>
-            <a:off x="0" y="861672"/>
-            <a:ext cx="4783015" cy="2672264"/>
-          </a:xfrm>
-          <a:prstGeom prst="rect">
-            <a:avLst/>
-          </a:prstGeom>
-          <a:noFill/>
-          <a:ln w="9525">
-            <a:noFill/>
-            <a:miter lim="800000"/>
-            <a:headEnd/>
-            <a:tailEnd/>
-          </a:ln>
-          <a:effectLst/>
-        </p:spPr>
-      </p:pic>
-    </p:spTree>
-  </p:cSld>
-  <p:clrMapOvr>
-    <a:masterClrMapping/>
-  </p:clrMapOvr>
-</p:sld>
-</file>
-
 <file path=ppt/slides/slide4.xml><?xml version="1.0" encoding="utf-8"?>
 <p:sld xmlns:a="http://schemas.openxmlformats.org/drawingml/2006/main" xmlns:r="http://schemas.openxmlformats.org/officeDocument/2006/relationships" xmlns:p="http://schemas.openxmlformats.org/presentationml/2006/main">
   <p:cSld>
@@ -35657,119 +35142,72 @@
           <a:chExt cx="0" cy="0"/>
         </a:xfrm>
       </p:grpSpPr>
-      <p:sp>
-        <p:nvSpPr>
-          <p:cNvPr id="2" name="Title 1"/>
-          <p:cNvSpPr>
-            <a:spLocks noGrp="1"/>
-          </p:cNvSpPr>
-          <p:nvPr>
-            <p:ph type="title"/>
-          </p:nvPr>
-        </p:nvSpPr>
-        <p:spPr/>
-        <p:txBody>
-          <a:bodyPr/>
-          <a:lstStyle/>
-          <a:p>
-            <a:r>
-              <a:rPr lang="en-US" dirty="0"/>
-              <a:t>Question 223.32.6</a:t>
-            </a:r>
-          </a:p>
-        </p:txBody>
-      </p:sp>
-      <p:sp>
-        <p:nvSpPr>
-          <p:cNvPr id="3" name="Content Placeholder 2"/>
-          <p:cNvSpPr>
-            <a:spLocks noGrp="1"/>
-          </p:cNvSpPr>
-          <p:nvPr>
-            <p:ph idx="1"/>
-          </p:nvPr>
-        </p:nvSpPr>
-        <p:spPr/>
-        <p:txBody>
-          <a:bodyPr/>
-          <a:lstStyle/>
-          <a:p>
-            <a:pPr>
-              <a:buNone/>
-            </a:pPr>
-            <a:r>
-              <a:rPr lang="en-US" dirty="0"/>
-              <a:t>Your nervous system needs sodium ions to work as charge carriers. How do you get sodium atoms in the body?</a:t>
-            </a:r>
-          </a:p>
-          <a:p>
-            <a:pPr marL="514350" indent="-514350">
-              <a:buFont typeface="+mj-lt"/>
-              <a:buAutoNum type="alphaLcParenR"/>
-            </a:pPr>
-            <a:r>
-              <a:rPr lang="en-US" dirty="0"/>
-              <a:t>You eat salt, and the water molecules in your body split up the sodium and the chlorine.</a:t>
-            </a:r>
-          </a:p>
-          <a:p>
-            <a:pPr marL="514350" indent="-514350">
-              <a:buFont typeface="+mj-lt"/>
-              <a:buAutoNum type="alphaLcParenR"/>
-            </a:pPr>
-            <a:r>
-              <a:rPr lang="en-US" dirty="0"/>
-              <a:t>You have an internal electrolysis system that splits up molecules using high voltages </a:t>
-            </a:r>
-          </a:p>
-          <a:p>
-            <a:pPr marL="514350" indent="-514350">
-              <a:buFont typeface="+mj-lt"/>
-              <a:buAutoNum type="alphaLcParenR"/>
-            </a:pPr>
-            <a:r>
-              <a:rPr lang="en-US" dirty="0"/>
-              <a:t>You are born with a large positive charge</a:t>
-            </a:r>
-          </a:p>
-          <a:p>
-            <a:pPr marL="514350" indent="-514350">
-              <a:buFont typeface="+mj-lt"/>
-              <a:buAutoNum type="alphaLcParenR"/>
-            </a:pPr>
-            <a:endParaRPr lang="en-US" dirty="0"/>
-          </a:p>
-        </p:txBody>
-      </p:sp>
-      <p:sp>
-        <p:nvSpPr>
-          <p:cNvPr id="4" name="Slide Number Placeholder 3"/>
-          <p:cNvSpPr>
-            <a:spLocks noGrp="1"/>
-          </p:cNvSpPr>
-          <p:nvPr>
-            <p:ph type="sldNum" sz="quarter" idx="12"/>
-          </p:nvPr>
-        </p:nvSpPr>
-        <p:spPr/>
-        <p:txBody>
-          <a:bodyPr/>
-          <a:lstStyle/>
-          <a:p>
-            <a:pPr>
-              <a:defRPr/>
-            </a:pPr>
-            <a:fld id="{64137B81-8888-4253-92EC-0AED2A590749}" type="slidenum">
-              <a:rPr lang="en-US" smtClean="0"/>
-              <a:pPr>
-                <a:defRPr/>
-              </a:pPr>
-              <a:t>40</a:t>
-            </a:fld>
-            <a:endParaRPr lang="en-US" dirty="0"/>
-          </a:p>
-        </p:txBody>
-      </p:sp>
+      <p:pic>
+        <p:nvPicPr>
+          <p:cNvPr id="7170" name="Picture 2"/>
+          <p:cNvPicPr>
+            <a:picLocks noChangeAspect="1" noChangeArrowheads="1"/>
+          </p:cNvPicPr>
+          <p:nvPr/>
+        </p:nvPicPr>
+        <p:blipFill>
+          <a:blip r:embed="rId2" cstate="print"/>
+          <a:srcRect/>
+          <a:stretch>
+            <a:fillRect/>
+          </a:stretch>
+        </p:blipFill>
+        <p:spPr bwMode="auto">
+          <a:xfrm>
+            <a:off x="4958503" y="792870"/>
+            <a:ext cx="4185497" cy="2864729"/>
+          </a:xfrm>
+          <a:prstGeom prst="rect">
+            <a:avLst/>
+          </a:prstGeom>
+          <a:noFill/>
+          <a:ln w="9525">
+            <a:noFill/>
+            <a:miter lim="800000"/>
+            <a:headEnd/>
+            <a:tailEnd/>
+          </a:ln>
+          <a:effectLst/>
+        </p:spPr>
+      </p:pic>
+      <p:pic>
+        <p:nvPicPr>
+          <p:cNvPr id="7171" name="Picture 3"/>
+          <p:cNvPicPr>
+            <a:picLocks noChangeAspect="1" noChangeArrowheads="1"/>
+          </p:cNvPicPr>
+          <p:nvPr/>
+        </p:nvPicPr>
+        <p:blipFill>
+          <a:blip r:embed="rId3" cstate="print"/>
+          <a:srcRect/>
+          <a:stretch>
+            <a:fillRect/>
+          </a:stretch>
+        </p:blipFill>
+        <p:spPr bwMode="auto">
+          <a:xfrm>
+            <a:off x="0" y="861672"/>
+            <a:ext cx="4783015" cy="2672264"/>
+          </a:xfrm>
+          <a:prstGeom prst="rect">
+            <a:avLst/>
+          </a:prstGeom>
+          <a:noFill/>
+          <a:ln w="9525">
+            <a:noFill/>
+            <a:miter lim="800000"/>
+            <a:headEnd/>
+            <a:tailEnd/>
+          </a:ln>
+          <a:effectLst/>
+        </p:spPr>
+      </p:pic>
     </p:spTree>
   </p:cSld>
   <p:clrMapOvr>

</xml_diff>